<commit_message>
new figures for gamma and housekeeping
</commit_message>
<xml_diff>
--- a/Figures draft for manuscript.pptx
+++ b/Figures draft for manuscript.pptx
@@ -8,8 +8,9 @@
     <p:sldId id="256" r:id="rId2"/>
     <p:sldId id="257" r:id="rId3"/>
     <p:sldId id="258" r:id="rId4"/>
-    <p:sldId id="259" r:id="rId5"/>
-    <p:sldId id="260" r:id="rId6"/>
+    <p:sldId id="261" r:id="rId5"/>
+    <p:sldId id="259" r:id="rId6"/>
+    <p:sldId id="260" r:id="rId7"/>
   </p:sldIdLst>
   <p:sldSz cx="9144000" cy="6858000" type="screen4x3"/>
   <p:notesSz cx="6858000" cy="9144000"/>
@@ -292,7 +293,7 @@
           <a:p>
             <a:fld id="{C2957447-5BFD-4CE2-A5BA-15C06B9C0B91}" type="datetimeFigureOut">
               <a:rPr lang="en-US" smtClean="0"/>
-              <a:t>5/21/2015</a:t>
+              <a:t>7/13/2015</a:t>
             </a:fld>
             <a:endParaRPr lang="en-US"/>
           </a:p>
@@ -462,7 +463,7 @@
           <a:p>
             <a:fld id="{C2957447-5BFD-4CE2-A5BA-15C06B9C0B91}" type="datetimeFigureOut">
               <a:rPr lang="en-US" smtClean="0"/>
-              <a:t>5/21/2015</a:t>
+              <a:t>7/13/2015</a:t>
             </a:fld>
             <a:endParaRPr lang="en-US"/>
           </a:p>
@@ -642,7 +643,7 @@
           <a:p>
             <a:fld id="{C2957447-5BFD-4CE2-A5BA-15C06B9C0B91}" type="datetimeFigureOut">
               <a:rPr lang="en-US" smtClean="0"/>
-              <a:t>5/21/2015</a:t>
+              <a:t>7/13/2015</a:t>
             </a:fld>
             <a:endParaRPr lang="en-US"/>
           </a:p>
@@ -812,7 +813,7 @@
           <a:p>
             <a:fld id="{C2957447-5BFD-4CE2-A5BA-15C06B9C0B91}" type="datetimeFigureOut">
               <a:rPr lang="en-US" smtClean="0"/>
-              <a:t>5/21/2015</a:t>
+              <a:t>7/13/2015</a:t>
             </a:fld>
             <a:endParaRPr lang="en-US"/>
           </a:p>
@@ -1058,7 +1059,7 @@
           <a:p>
             <a:fld id="{C2957447-5BFD-4CE2-A5BA-15C06B9C0B91}" type="datetimeFigureOut">
               <a:rPr lang="en-US" smtClean="0"/>
-              <a:t>5/21/2015</a:t>
+              <a:t>7/13/2015</a:t>
             </a:fld>
             <a:endParaRPr lang="en-US"/>
           </a:p>
@@ -1346,7 +1347,7 @@
           <a:p>
             <a:fld id="{C2957447-5BFD-4CE2-A5BA-15C06B9C0B91}" type="datetimeFigureOut">
               <a:rPr lang="en-US" smtClean="0"/>
-              <a:t>5/21/2015</a:t>
+              <a:t>7/13/2015</a:t>
             </a:fld>
             <a:endParaRPr lang="en-US"/>
           </a:p>
@@ -1768,7 +1769,7 @@
           <a:p>
             <a:fld id="{C2957447-5BFD-4CE2-A5BA-15C06B9C0B91}" type="datetimeFigureOut">
               <a:rPr lang="en-US" smtClean="0"/>
-              <a:t>5/21/2015</a:t>
+              <a:t>7/13/2015</a:t>
             </a:fld>
             <a:endParaRPr lang="en-US"/>
           </a:p>
@@ -1886,7 +1887,7 @@
           <a:p>
             <a:fld id="{C2957447-5BFD-4CE2-A5BA-15C06B9C0B91}" type="datetimeFigureOut">
               <a:rPr lang="en-US" smtClean="0"/>
-              <a:t>5/21/2015</a:t>
+              <a:t>7/13/2015</a:t>
             </a:fld>
             <a:endParaRPr lang="en-US"/>
           </a:p>
@@ -1981,7 +1982,7 @@
           <a:p>
             <a:fld id="{C2957447-5BFD-4CE2-A5BA-15C06B9C0B91}" type="datetimeFigureOut">
               <a:rPr lang="en-US" smtClean="0"/>
-              <a:t>5/21/2015</a:t>
+              <a:t>7/13/2015</a:t>
             </a:fld>
             <a:endParaRPr lang="en-US"/>
           </a:p>
@@ -2258,7 +2259,7 @@
           <a:p>
             <a:fld id="{C2957447-5BFD-4CE2-A5BA-15C06B9C0B91}" type="datetimeFigureOut">
               <a:rPr lang="en-US" smtClean="0"/>
-              <a:t>5/21/2015</a:t>
+              <a:t>7/13/2015</a:t>
             </a:fld>
             <a:endParaRPr lang="en-US"/>
           </a:p>
@@ -2511,7 +2512,7 @@
           <a:p>
             <a:fld id="{C2957447-5BFD-4CE2-A5BA-15C06B9C0B91}" type="datetimeFigureOut">
               <a:rPr lang="en-US" smtClean="0"/>
-              <a:t>5/21/2015</a:t>
+              <a:t>7/13/2015</a:t>
             </a:fld>
             <a:endParaRPr lang="en-US"/>
           </a:p>
@@ -2724,7 +2725,7 @@
           <a:p>
             <a:fld id="{C2957447-5BFD-4CE2-A5BA-15C06B9C0B91}" type="datetimeFigureOut">
               <a:rPr lang="en-US" smtClean="0"/>
-              <a:t>5/21/2015</a:t>
+              <a:t>7/13/2015</a:t>
             </a:fld>
             <a:endParaRPr lang="en-US"/>
           </a:p>
@@ -27765,7 +27766,7 @@
           <p:nvPr/>
         </p:nvPicPr>
         <p:blipFill>
-          <a:blip r:embed="rId3">
+          <a:blip r:embed="rId2">
             <a:extLst>
               <a:ext uri="{28A0092B-C50C-407E-A947-70E740481C1C}">
                 <a14:useLocalDpi xmlns:a14="http://schemas.microsoft.com/office/drawing/2010/main" val="0"/>
@@ -27841,6 +27842,138 @@
 </file>
 
 <file path=ppt/slides/slide4.xml><?xml version="1.0" encoding="utf-8"?>
+<p:sld xmlns:a="http://schemas.openxmlformats.org/drawingml/2006/main" xmlns:r="http://schemas.openxmlformats.org/officeDocument/2006/relationships" xmlns:p="http://schemas.openxmlformats.org/presentationml/2006/main">
+  <p:cSld>
+    <p:spTree>
+      <p:nvGrpSpPr>
+        <p:cNvPr id="1" name=""/>
+        <p:cNvGrpSpPr/>
+        <p:nvPr/>
+      </p:nvGrpSpPr>
+      <p:grpSpPr>
+        <a:xfrm>
+          <a:off x="0" y="0"/>
+          <a:ext cx="0" cy="0"/>
+          <a:chOff x="0" y="0"/>
+          <a:chExt cx="0" cy="0"/>
+        </a:xfrm>
+      </p:grpSpPr>
+      <p:pic>
+        <p:nvPicPr>
+          <p:cNvPr id="43010" name="Picture 2"/>
+          <p:cNvPicPr>
+            <a:picLocks noChangeAspect="1" noChangeArrowheads="1"/>
+          </p:cNvPicPr>
+          <p:nvPr/>
+        </p:nvPicPr>
+        <p:blipFill>
+          <a:blip r:embed="rId2">
+            <a:extLst>
+              <a:ext uri="{28A0092B-C50C-407E-A947-70E740481C1C}">
+                <a14:useLocalDpi xmlns:a14="http://schemas.microsoft.com/office/drawing/2010/main" val="0"/>
+              </a:ext>
+            </a:extLst>
+          </a:blip>
+          <a:srcRect/>
+          <a:stretch>
+            <a:fillRect/>
+          </a:stretch>
+        </p:blipFill>
+        <p:spPr bwMode="auto">
+          <a:xfrm>
+            <a:off x="1733550" y="995363"/>
+            <a:ext cx="5676900" cy="4867275"/>
+          </a:xfrm>
+          <a:prstGeom prst="rect">
+            <a:avLst/>
+          </a:prstGeom>
+          <a:noFill/>
+          <a:ln>
+            <a:noFill/>
+          </a:ln>
+          <a:effectLst/>
+          <a:extLst>
+            <a:ext uri="{909E8E84-426E-40DD-AFC4-6F175D3DCCD1}">
+              <a14:hiddenFill xmlns:a14="http://schemas.microsoft.com/office/drawing/2010/main">
+                <a:solidFill>
+                  <a:schemeClr val="accent1"/>
+                </a:solidFill>
+              </a14:hiddenFill>
+            </a:ext>
+            <a:ext uri="{91240B29-F687-4F45-9708-019B960494DF}">
+              <a14:hiddenLine xmlns:a14="http://schemas.microsoft.com/office/drawing/2010/main" w="9525">
+                <a:solidFill>
+                  <a:schemeClr val="tx1"/>
+                </a:solidFill>
+                <a:miter lim="800000"/>
+                <a:headEnd/>
+                <a:tailEnd/>
+              </a14:hiddenLine>
+            </a:ext>
+            <a:ext uri="{AF507438-7753-43E0-B8FC-AC1667EBCBE1}">
+              <a14:hiddenEffects xmlns:a14="http://schemas.microsoft.com/office/drawing/2010/main">
+                <a:effectLst>
+                  <a:outerShdw dist="35921" dir="2700000" algn="ctr" rotWithShape="0">
+                    <a:schemeClr val="bg2"/>
+                  </a:outerShdw>
+                </a:effectLst>
+              </a14:hiddenEffects>
+            </a:ext>
+          </a:extLst>
+        </p:spPr>
+      </p:pic>
+      <p:sp>
+        <p:nvSpPr>
+          <p:cNvPr id="3" name="2 CuadroTexto"/>
+          <p:cNvSpPr txBox="1"/>
+          <p:nvPr/>
+        </p:nvSpPr>
+        <p:spPr>
+          <a:xfrm>
+            <a:off x="2915816" y="116632"/>
+            <a:ext cx="4968552" cy="707886"/>
+          </a:xfrm>
+          <a:prstGeom prst="rect">
+            <a:avLst/>
+          </a:prstGeom>
+          <a:noFill/>
+        </p:spPr>
+        <p:txBody>
+          <a:bodyPr wrap="square" rtlCol="0">
+            <a:spAutoFit/>
+          </a:bodyPr>
+          <a:lstStyle/>
+          <a:p>
+            <a:r>
+              <a:rPr lang="en-US" sz="4000" b="1" dirty="0" smtClean="0">
+                <a:solidFill>
+                  <a:srgbClr val="FF0000"/>
+                </a:solidFill>
+              </a:rPr>
+              <a:t>New Version!</a:t>
+            </a:r>
+            <a:endParaRPr lang="en-US" sz="4000" b="1" dirty="0">
+              <a:solidFill>
+                <a:srgbClr val="FF0000"/>
+              </a:solidFill>
+            </a:endParaRPr>
+          </a:p>
+        </p:txBody>
+      </p:sp>
+    </p:spTree>
+    <p:extLst>
+      <p:ext uri="{BB962C8B-B14F-4D97-AF65-F5344CB8AC3E}">
+        <p14:creationId xmlns:p14="http://schemas.microsoft.com/office/powerpoint/2010/main" val="3828469362"/>
+      </p:ext>
+    </p:extLst>
+  </p:cSld>
+  <p:clrMapOvr>
+    <a:masterClrMapping/>
+  </p:clrMapOvr>
+</p:sld>
+</file>
+
+<file path=ppt/slides/slide5.xml><?xml version="1.0" encoding="utf-8"?>
 <p:sld xmlns:a="http://schemas.openxmlformats.org/drawingml/2006/main" xmlns:r="http://schemas.openxmlformats.org/officeDocument/2006/relationships" xmlns:p="http://schemas.openxmlformats.org/presentationml/2006/main">
   <p:cSld>
     <p:spTree>
@@ -27957,7 +28090,7 @@
 </p:sld>
 </file>
 
-<file path=ppt/slides/slide5.xml><?xml version="1.0" encoding="utf-8"?>
+<file path=ppt/slides/slide6.xml><?xml version="1.0" encoding="utf-8"?>
 <p:sld xmlns:a="http://schemas.openxmlformats.org/drawingml/2006/main" xmlns:r="http://schemas.openxmlformats.org/officeDocument/2006/relationships" xmlns:p="http://schemas.openxmlformats.org/presentationml/2006/main">
   <p:cSld>
     <p:spTree>
@@ -27974,6 +28107,108 @@
           <a:chExt cx="0" cy="0"/>
         </a:xfrm>
       </p:grpSpPr>
+      <p:pic>
+        <p:nvPicPr>
+          <p:cNvPr id="44034" name="Picture 2"/>
+          <p:cNvPicPr>
+            <a:picLocks noChangeAspect="1" noChangeArrowheads="1"/>
+          </p:cNvPicPr>
+          <p:nvPr/>
+        </p:nvPicPr>
+        <p:blipFill>
+          <a:blip r:embed="rId2">
+            <a:extLst>
+              <a:ext uri="{28A0092B-C50C-407E-A947-70E740481C1C}">
+                <a14:useLocalDpi xmlns:a14="http://schemas.microsoft.com/office/drawing/2010/main" val="0"/>
+              </a:ext>
+            </a:extLst>
+          </a:blip>
+          <a:srcRect/>
+          <a:stretch>
+            <a:fillRect/>
+          </a:stretch>
+        </p:blipFill>
+        <p:spPr bwMode="auto">
+          <a:xfrm>
+            <a:off x="1733550" y="995363"/>
+            <a:ext cx="5676900" cy="4867275"/>
+          </a:xfrm>
+          <a:prstGeom prst="rect">
+            <a:avLst/>
+          </a:prstGeom>
+          <a:noFill/>
+          <a:ln>
+            <a:noFill/>
+          </a:ln>
+          <a:effectLst/>
+          <a:extLst>
+            <a:ext uri="{909E8E84-426E-40DD-AFC4-6F175D3DCCD1}">
+              <a14:hiddenFill xmlns:a14="http://schemas.microsoft.com/office/drawing/2010/main">
+                <a:solidFill>
+                  <a:schemeClr val="accent1"/>
+                </a:solidFill>
+              </a14:hiddenFill>
+            </a:ext>
+            <a:ext uri="{91240B29-F687-4F45-9708-019B960494DF}">
+              <a14:hiddenLine xmlns:a14="http://schemas.microsoft.com/office/drawing/2010/main" w="9525">
+                <a:solidFill>
+                  <a:schemeClr val="tx1"/>
+                </a:solidFill>
+                <a:miter lim="800000"/>
+                <a:headEnd/>
+                <a:tailEnd/>
+              </a14:hiddenLine>
+            </a:ext>
+            <a:ext uri="{AF507438-7753-43E0-B8FC-AC1667EBCBE1}">
+              <a14:hiddenEffects xmlns:a14="http://schemas.microsoft.com/office/drawing/2010/main">
+                <a:effectLst>
+                  <a:outerShdw dist="35921" dir="2700000" algn="ctr" rotWithShape="0">
+                    <a:schemeClr val="bg2"/>
+                  </a:outerShdw>
+                </a:effectLst>
+              </a14:hiddenEffects>
+            </a:ext>
+          </a:extLst>
+        </p:spPr>
+      </p:pic>
+      <p:sp>
+        <p:nvSpPr>
+          <p:cNvPr id="3" name="2 CuadroTexto"/>
+          <p:cNvSpPr txBox="1"/>
+          <p:nvPr/>
+        </p:nvSpPr>
+        <p:spPr>
+          <a:xfrm>
+            <a:off x="2915816" y="116632"/>
+            <a:ext cx="4968552" cy="707886"/>
+          </a:xfrm>
+          <a:prstGeom prst="rect">
+            <a:avLst/>
+          </a:prstGeom>
+          <a:noFill/>
+        </p:spPr>
+        <p:txBody>
+          <a:bodyPr wrap="square" rtlCol="0">
+            <a:spAutoFit/>
+          </a:bodyPr>
+          <a:lstStyle/>
+          <a:p>
+            <a:r>
+              <a:rPr lang="en-US" sz="4000" b="1" dirty="0" smtClean="0">
+                <a:solidFill>
+                  <a:srgbClr val="FF0000"/>
+                </a:solidFill>
+              </a:rPr>
+              <a:t>New Version!</a:t>
+            </a:r>
+            <a:endParaRPr lang="en-US" sz="4000" b="1" dirty="0">
+              <a:solidFill>
+                <a:srgbClr val="FF0000"/>
+              </a:solidFill>
+            </a:endParaRPr>
+          </a:p>
+        </p:txBody>
+      </p:sp>
     </p:spTree>
     <p:extLst>
       <p:ext uri="{BB962C8B-B14F-4D97-AF65-F5344CB8AC3E}">

</xml_diff>

<commit_message>
Working on new figures
</commit_message>
<xml_diff>
--- a/Figures draft for manuscript.pptx
+++ b/Figures draft for manuscript.pptx
@@ -11,6 +11,12 @@
     <p:sldId id="261" r:id="rId5"/>
     <p:sldId id="259" r:id="rId6"/>
     <p:sldId id="260" r:id="rId7"/>
+    <p:sldId id="262" r:id="rId8"/>
+    <p:sldId id="263" r:id="rId9"/>
+    <p:sldId id="264" r:id="rId10"/>
+    <p:sldId id="265" r:id="rId11"/>
+    <p:sldId id="266" r:id="rId12"/>
+    <p:sldId id="267" r:id="rId13"/>
   </p:sldIdLst>
   <p:sldSz cx="9144000" cy="6858000" type="screen4x3"/>
   <p:notesSz cx="6858000" cy="9144000"/>
@@ -293,7 +299,7 @@
           <a:p>
             <a:fld id="{C2957447-5BFD-4CE2-A5BA-15C06B9C0B91}" type="datetimeFigureOut">
               <a:rPr lang="en-US" smtClean="0"/>
-              <a:t>7/13/2015</a:t>
+              <a:t>7/20/2015</a:t>
             </a:fld>
             <a:endParaRPr lang="en-US"/>
           </a:p>
@@ -463,7 +469,7 @@
           <a:p>
             <a:fld id="{C2957447-5BFD-4CE2-A5BA-15C06B9C0B91}" type="datetimeFigureOut">
               <a:rPr lang="en-US" smtClean="0"/>
-              <a:t>7/13/2015</a:t>
+              <a:t>7/20/2015</a:t>
             </a:fld>
             <a:endParaRPr lang="en-US"/>
           </a:p>
@@ -643,7 +649,7 @@
           <a:p>
             <a:fld id="{C2957447-5BFD-4CE2-A5BA-15C06B9C0B91}" type="datetimeFigureOut">
               <a:rPr lang="en-US" smtClean="0"/>
-              <a:t>7/13/2015</a:t>
+              <a:t>7/20/2015</a:t>
             </a:fld>
             <a:endParaRPr lang="en-US"/>
           </a:p>
@@ -813,7 +819,7 @@
           <a:p>
             <a:fld id="{C2957447-5BFD-4CE2-A5BA-15C06B9C0B91}" type="datetimeFigureOut">
               <a:rPr lang="en-US" smtClean="0"/>
-              <a:t>7/13/2015</a:t>
+              <a:t>7/20/2015</a:t>
             </a:fld>
             <a:endParaRPr lang="en-US"/>
           </a:p>
@@ -1059,7 +1065,7 @@
           <a:p>
             <a:fld id="{C2957447-5BFD-4CE2-A5BA-15C06B9C0B91}" type="datetimeFigureOut">
               <a:rPr lang="en-US" smtClean="0"/>
-              <a:t>7/13/2015</a:t>
+              <a:t>7/20/2015</a:t>
             </a:fld>
             <a:endParaRPr lang="en-US"/>
           </a:p>
@@ -1347,7 +1353,7 @@
           <a:p>
             <a:fld id="{C2957447-5BFD-4CE2-A5BA-15C06B9C0B91}" type="datetimeFigureOut">
               <a:rPr lang="en-US" smtClean="0"/>
-              <a:t>7/13/2015</a:t>
+              <a:t>7/20/2015</a:t>
             </a:fld>
             <a:endParaRPr lang="en-US"/>
           </a:p>
@@ -1769,7 +1775,7 @@
           <a:p>
             <a:fld id="{C2957447-5BFD-4CE2-A5BA-15C06B9C0B91}" type="datetimeFigureOut">
               <a:rPr lang="en-US" smtClean="0"/>
-              <a:t>7/13/2015</a:t>
+              <a:t>7/20/2015</a:t>
             </a:fld>
             <a:endParaRPr lang="en-US"/>
           </a:p>
@@ -1887,7 +1893,7 @@
           <a:p>
             <a:fld id="{C2957447-5BFD-4CE2-A5BA-15C06B9C0B91}" type="datetimeFigureOut">
               <a:rPr lang="en-US" smtClean="0"/>
-              <a:t>7/13/2015</a:t>
+              <a:t>7/20/2015</a:t>
             </a:fld>
             <a:endParaRPr lang="en-US"/>
           </a:p>
@@ -1982,7 +1988,7 @@
           <a:p>
             <a:fld id="{C2957447-5BFD-4CE2-A5BA-15C06B9C0B91}" type="datetimeFigureOut">
               <a:rPr lang="en-US" smtClean="0"/>
-              <a:t>7/13/2015</a:t>
+              <a:t>7/20/2015</a:t>
             </a:fld>
             <a:endParaRPr lang="en-US"/>
           </a:p>
@@ -2259,7 +2265,7 @@
           <a:p>
             <a:fld id="{C2957447-5BFD-4CE2-A5BA-15C06B9C0B91}" type="datetimeFigureOut">
               <a:rPr lang="en-US" smtClean="0"/>
-              <a:t>7/13/2015</a:t>
+              <a:t>7/20/2015</a:t>
             </a:fld>
             <a:endParaRPr lang="en-US"/>
           </a:p>
@@ -2512,7 +2518,7 @@
           <a:p>
             <a:fld id="{C2957447-5BFD-4CE2-A5BA-15C06B9C0B91}" type="datetimeFigureOut">
               <a:rPr lang="en-US" smtClean="0"/>
-              <a:t>7/13/2015</a:t>
+              <a:t>7/20/2015</a:t>
             </a:fld>
             <a:endParaRPr lang="en-US"/>
           </a:p>
@@ -2725,7 +2731,7 @@
           <a:p>
             <a:fld id="{C2957447-5BFD-4CE2-A5BA-15C06B9C0B91}" type="datetimeFigureOut">
               <a:rPr lang="en-US" smtClean="0"/>
-              <a:t>7/13/2015</a:t>
+              <a:t>7/20/2015</a:t>
             </a:fld>
             <a:endParaRPr lang="en-US"/>
           </a:p>
@@ -3166,6 +3172,382 @@
 </p:sld>
 </file>
 
+<file path=ppt/slides/slide10.xml><?xml version="1.0" encoding="utf-8"?>
+<p:sld xmlns:a="http://schemas.openxmlformats.org/drawingml/2006/main" xmlns:r="http://schemas.openxmlformats.org/officeDocument/2006/relationships" xmlns:p="http://schemas.openxmlformats.org/presentationml/2006/main">
+  <p:cSld>
+    <p:spTree>
+      <p:nvGrpSpPr>
+        <p:cNvPr id="1" name=""/>
+        <p:cNvGrpSpPr/>
+        <p:nvPr/>
+      </p:nvGrpSpPr>
+      <p:grpSpPr>
+        <a:xfrm>
+          <a:off x="0" y="0"/>
+          <a:ext cx="0" cy="0"/>
+          <a:chOff x="0" y="0"/>
+          <a:chExt cx="0" cy="0"/>
+        </a:xfrm>
+      </p:grpSpPr>
+      <p:pic>
+        <p:nvPicPr>
+          <p:cNvPr id="3074" name="Picture 2"/>
+          <p:cNvPicPr>
+            <a:picLocks noChangeAspect="1" noChangeArrowheads="1"/>
+          </p:cNvPicPr>
+          <p:nvPr/>
+        </p:nvPicPr>
+        <p:blipFill>
+          <a:blip r:embed="rId2">
+            <a:extLst>
+              <a:ext uri="{28A0092B-C50C-407E-A947-70E740481C1C}">
+                <a14:useLocalDpi xmlns:a14="http://schemas.microsoft.com/office/drawing/2010/main" val="0"/>
+              </a:ext>
+            </a:extLst>
+          </a:blip>
+          <a:srcRect/>
+          <a:stretch>
+            <a:fillRect/>
+          </a:stretch>
+        </p:blipFill>
+        <p:spPr bwMode="auto">
+          <a:xfrm>
+            <a:off x="1676400" y="2328863"/>
+            <a:ext cx="5791200" cy="2200275"/>
+          </a:xfrm>
+          <a:prstGeom prst="rect">
+            <a:avLst/>
+          </a:prstGeom>
+          <a:noFill/>
+          <a:ln>
+            <a:noFill/>
+          </a:ln>
+          <a:extLst>
+            <a:ext uri="{909E8E84-426E-40DD-AFC4-6F175D3DCCD1}">
+              <a14:hiddenFill xmlns:a14="http://schemas.microsoft.com/office/drawing/2010/main">
+                <a:solidFill>
+                  <a:schemeClr val="accent1"/>
+                </a:solidFill>
+              </a14:hiddenFill>
+            </a:ext>
+            <a:ext uri="{91240B29-F687-4F45-9708-019B960494DF}">
+              <a14:hiddenLine xmlns:a14="http://schemas.microsoft.com/office/drawing/2010/main" w="9525">
+                <a:solidFill>
+                  <a:schemeClr val="tx1"/>
+                </a:solidFill>
+                <a:miter lim="800000"/>
+                <a:headEnd/>
+                <a:tailEnd/>
+              </a14:hiddenLine>
+            </a:ext>
+          </a:extLst>
+        </p:spPr>
+      </p:pic>
+    </p:spTree>
+    <p:extLst>
+      <p:ext uri="{BB962C8B-B14F-4D97-AF65-F5344CB8AC3E}">
+        <p14:creationId xmlns:p14="http://schemas.microsoft.com/office/powerpoint/2010/main" val="1767875964"/>
+      </p:ext>
+    </p:extLst>
+  </p:cSld>
+  <p:clrMapOvr>
+    <a:masterClrMapping/>
+  </p:clrMapOvr>
+</p:sld>
+</file>
+
+<file path=ppt/slides/slide11.xml><?xml version="1.0" encoding="utf-8"?>
+<p:sld xmlns:a="http://schemas.openxmlformats.org/drawingml/2006/main" xmlns:r="http://schemas.openxmlformats.org/officeDocument/2006/relationships" xmlns:p="http://schemas.openxmlformats.org/presentationml/2006/main">
+  <p:cSld>
+    <p:spTree>
+      <p:nvGrpSpPr>
+        <p:cNvPr id="1" name=""/>
+        <p:cNvGrpSpPr/>
+        <p:nvPr/>
+      </p:nvGrpSpPr>
+      <p:grpSpPr>
+        <a:xfrm>
+          <a:off x="0" y="0"/>
+          <a:ext cx="0" cy="0"/>
+          <a:chOff x="0" y="0"/>
+          <a:chExt cx="0" cy="0"/>
+        </a:xfrm>
+      </p:grpSpPr>
+      <p:pic>
+        <p:nvPicPr>
+          <p:cNvPr id="5122" name="Picture 2"/>
+          <p:cNvPicPr>
+            <a:picLocks noChangeAspect="1" noChangeArrowheads="1"/>
+          </p:cNvPicPr>
+          <p:nvPr/>
+        </p:nvPicPr>
+        <p:blipFill>
+          <a:blip r:embed="rId2">
+            <a:extLst>
+              <a:ext uri="{28A0092B-C50C-407E-A947-70E740481C1C}">
+                <a14:useLocalDpi xmlns:a14="http://schemas.microsoft.com/office/drawing/2010/main" val="0"/>
+              </a:ext>
+            </a:extLst>
+          </a:blip>
+          <a:srcRect/>
+          <a:stretch>
+            <a:fillRect/>
+          </a:stretch>
+        </p:blipFill>
+        <p:spPr bwMode="auto">
+          <a:xfrm>
+            <a:off x="1566863" y="1217613"/>
+            <a:ext cx="6010275" cy="4429125"/>
+          </a:xfrm>
+          <a:prstGeom prst="rect">
+            <a:avLst/>
+          </a:prstGeom>
+          <a:noFill/>
+          <a:ln>
+            <a:noFill/>
+          </a:ln>
+          <a:effectLst/>
+          <a:extLst>
+            <a:ext uri="{909E8E84-426E-40DD-AFC4-6F175D3DCCD1}">
+              <a14:hiddenFill xmlns:a14="http://schemas.microsoft.com/office/drawing/2010/main">
+                <a:solidFill>
+                  <a:schemeClr val="accent1"/>
+                </a:solidFill>
+              </a14:hiddenFill>
+            </a:ext>
+            <a:ext uri="{91240B29-F687-4F45-9708-019B960494DF}">
+              <a14:hiddenLine xmlns:a14="http://schemas.microsoft.com/office/drawing/2010/main" w="9525">
+                <a:solidFill>
+                  <a:schemeClr val="tx1"/>
+                </a:solidFill>
+                <a:miter lim="800000"/>
+                <a:headEnd/>
+                <a:tailEnd/>
+              </a14:hiddenLine>
+            </a:ext>
+            <a:ext uri="{AF507438-7753-43E0-B8FC-AC1667EBCBE1}">
+              <a14:hiddenEffects xmlns:a14="http://schemas.microsoft.com/office/drawing/2010/main">
+                <a:effectLst>
+                  <a:outerShdw dist="35921" dir="2700000" algn="ctr" rotWithShape="0">
+                    <a:schemeClr val="bg2"/>
+                  </a:outerShdw>
+                </a:effectLst>
+              </a14:hiddenEffects>
+            </a:ext>
+          </a:extLst>
+        </p:spPr>
+      </p:pic>
+      <p:sp>
+        <p:nvSpPr>
+          <p:cNvPr id="2" name="1 CuadroTexto"/>
+          <p:cNvSpPr txBox="1"/>
+          <p:nvPr/>
+        </p:nvSpPr>
+        <p:spPr>
+          <a:xfrm>
+            <a:off x="2483768" y="404664"/>
+            <a:ext cx="3672408" cy="369332"/>
+          </a:xfrm>
+          <a:prstGeom prst="rect">
+            <a:avLst/>
+          </a:prstGeom>
+          <a:noFill/>
+        </p:spPr>
+        <p:txBody>
+          <a:bodyPr wrap="square" rtlCol="0">
+            <a:spAutoFit/>
+          </a:bodyPr>
+          <a:lstStyle/>
+          <a:p>
+            <a:r>
+              <a:rPr lang="en-US" dirty="0" smtClean="0"/>
+              <a:t>Theta two, n=2</a:t>
+            </a:r>
+            <a:endParaRPr lang="en-US" dirty="0"/>
+          </a:p>
+        </p:txBody>
+      </p:sp>
+      <p:pic>
+        <p:nvPicPr>
+          <p:cNvPr id="5123" name="Picture 3"/>
+          <p:cNvPicPr>
+            <a:picLocks noChangeAspect="1" noChangeArrowheads="1"/>
+          </p:cNvPicPr>
+          <p:nvPr/>
+        </p:nvPicPr>
+        <p:blipFill>
+          <a:blip r:embed="rId3">
+            <a:extLst>
+              <a:ext uri="{28A0092B-C50C-407E-A947-70E740481C1C}">
+                <a14:useLocalDpi xmlns:a14="http://schemas.microsoft.com/office/drawing/2010/main" val="0"/>
+              </a:ext>
+            </a:extLst>
+          </a:blip>
+          <a:srcRect/>
+          <a:stretch>
+            <a:fillRect/>
+          </a:stretch>
+        </p:blipFill>
+        <p:spPr bwMode="auto">
+          <a:xfrm>
+            <a:off x="1719263" y="1366838"/>
+            <a:ext cx="6010275" cy="4429125"/>
+          </a:xfrm>
+          <a:prstGeom prst="rect">
+            <a:avLst/>
+          </a:prstGeom>
+          <a:noFill/>
+          <a:ln>
+            <a:noFill/>
+          </a:ln>
+          <a:extLst>
+            <a:ext uri="{909E8E84-426E-40DD-AFC4-6F175D3DCCD1}">
+              <a14:hiddenFill xmlns:a14="http://schemas.microsoft.com/office/drawing/2010/main">
+                <a:solidFill>
+                  <a:schemeClr val="accent1"/>
+                </a:solidFill>
+              </a14:hiddenFill>
+            </a:ext>
+            <a:ext uri="{91240B29-F687-4F45-9708-019B960494DF}">
+              <a14:hiddenLine xmlns:a14="http://schemas.microsoft.com/office/drawing/2010/main" w="9525">
+                <a:solidFill>
+                  <a:schemeClr val="tx1"/>
+                </a:solidFill>
+                <a:miter lim="800000"/>
+                <a:headEnd/>
+                <a:tailEnd/>
+              </a14:hiddenLine>
+            </a:ext>
+          </a:extLst>
+        </p:spPr>
+      </p:pic>
+    </p:spTree>
+    <p:extLst>
+      <p:ext uri="{BB962C8B-B14F-4D97-AF65-F5344CB8AC3E}">
+        <p14:creationId xmlns:p14="http://schemas.microsoft.com/office/powerpoint/2010/main" val="4277121361"/>
+      </p:ext>
+    </p:extLst>
+  </p:cSld>
+  <p:clrMapOvr>
+    <a:masterClrMapping/>
+  </p:clrMapOvr>
+</p:sld>
+</file>
+
+<file path=ppt/slides/slide12.xml><?xml version="1.0" encoding="utf-8"?>
+<p:sld xmlns:a="http://schemas.openxmlformats.org/drawingml/2006/main" xmlns:r="http://schemas.openxmlformats.org/officeDocument/2006/relationships" xmlns:p="http://schemas.openxmlformats.org/presentationml/2006/main">
+  <p:cSld>
+    <p:spTree>
+      <p:nvGrpSpPr>
+        <p:cNvPr id="1" name=""/>
+        <p:cNvGrpSpPr/>
+        <p:nvPr/>
+      </p:nvGrpSpPr>
+      <p:grpSpPr>
+        <a:xfrm>
+          <a:off x="0" y="0"/>
+          <a:ext cx="0" cy="0"/>
+          <a:chOff x="0" y="0"/>
+          <a:chExt cx="0" cy="0"/>
+        </a:xfrm>
+      </p:grpSpPr>
+      <p:pic>
+        <p:nvPicPr>
+          <p:cNvPr id="6146" name="Picture 2"/>
+          <p:cNvPicPr>
+            <a:picLocks noChangeAspect="1" noChangeArrowheads="1"/>
+          </p:cNvPicPr>
+          <p:nvPr/>
+        </p:nvPicPr>
+        <p:blipFill>
+          <a:blip r:embed="rId2">
+            <a:extLst>
+              <a:ext uri="{28A0092B-C50C-407E-A947-70E740481C1C}">
+                <a14:useLocalDpi xmlns:a14="http://schemas.microsoft.com/office/drawing/2010/main" val="0"/>
+              </a:ext>
+            </a:extLst>
+          </a:blip>
+          <a:srcRect/>
+          <a:stretch>
+            <a:fillRect/>
+          </a:stretch>
+        </p:blipFill>
+        <p:spPr bwMode="auto">
+          <a:xfrm>
+            <a:off x="1566863" y="1214438"/>
+            <a:ext cx="6010275" cy="4429125"/>
+          </a:xfrm>
+          <a:prstGeom prst="rect">
+            <a:avLst/>
+          </a:prstGeom>
+          <a:noFill/>
+          <a:ln>
+            <a:noFill/>
+          </a:ln>
+          <a:extLst>
+            <a:ext uri="{909E8E84-426E-40DD-AFC4-6F175D3DCCD1}">
+              <a14:hiddenFill xmlns:a14="http://schemas.microsoft.com/office/drawing/2010/main">
+                <a:solidFill>
+                  <a:schemeClr val="accent1"/>
+                </a:solidFill>
+              </a14:hiddenFill>
+            </a:ext>
+            <a:ext uri="{91240B29-F687-4F45-9708-019B960494DF}">
+              <a14:hiddenLine xmlns:a14="http://schemas.microsoft.com/office/drawing/2010/main" w="9525">
+                <a:solidFill>
+                  <a:schemeClr val="tx1"/>
+                </a:solidFill>
+                <a:miter lim="800000"/>
+                <a:headEnd/>
+                <a:tailEnd/>
+              </a14:hiddenLine>
+            </a:ext>
+          </a:extLst>
+        </p:spPr>
+      </p:pic>
+      <p:sp>
+        <p:nvSpPr>
+          <p:cNvPr id="3" name="2 CuadroTexto"/>
+          <p:cNvSpPr txBox="1"/>
+          <p:nvPr/>
+        </p:nvSpPr>
+        <p:spPr>
+          <a:xfrm>
+            <a:off x="2483768" y="404664"/>
+            <a:ext cx="3672408" cy="369332"/>
+          </a:xfrm>
+          <a:prstGeom prst="rect">
+            <a:avLst/>
+          </a:prstGeom>
+          <a:noFill/>
+        </p:spPr>
+        <p:txBody>
+          <a:bodyPr wrap="square" rtlCol="0">
+            <a:spAutoFit/>
+          </a:bodyPr>
+          <a:lstStyle/>
+          <a:p>
+            <a:r>
+              <a:rPr lang="en-US" dirty="0" smtClean="0"/>
+              <a:t>Theta ten, n=2</a:t>
+            </a:r>
+            <a:endParaRPr lang="en-US" dirty="0"/>
+          </a:p>
+        </p:txBody>
+      </p:sp>
+    </p:spTree>
+    <p:extLst>
+      <p:ext uri="{BB962C8B-B14F-4D97-AF65-F5344CB8AC3E}">
+        <p14:creationId xmlns:p14="http://schemas.microsoft.com/office/powerpoint/2010/main" val="672208786"/>
+      </p:ext>
+    </p:extLst>
+  </p:cSld>
+  <p:clrMapOvr>
+    <a:masterClrMapping/>
+  </p:clrMapOvr>
+</p:sld>
+</file>
+
 <file path=ppt/slides/slide2.xml><?xml version="1.0" encoding="utf-8"?>
 <p:sld xmlns:a="http://schemas.openxmlformats.org/drawingml/2006/main" xmlns:r="http://schemas.openxmlformats.org/officeDocument/2006/relationships" xmlns:p="http://schemas.openxmlformats.org/presentationml/2006/main">
   <p:cSld>
@@ -28219,6 +28601,837 @@
   <p:clrMapOvr>
     <a:masterClrMapping/>
   </p:clrMapOvr>
+  <p:timing>
+    <p:tnLst>
+      <p:par>
+        <p:cTn id="1" dur="indefinite" restart="never" nodeType="tmRoot"/>
+      </p:par>
+    </p:tnLst>
+  </p:timing>
+</p:sld>
+</file>
+
+<file path=ppt/slides/slide7.xml><?xml version="1.0" encoding="utf-8"?>
+<p:sld xmlns:a="http://schemas.openxmlformats.org/drawingml/2006/main" xmlns:r="http://schemas.openxmlformats.org/officeDocument/2006/relationships" xmlns:p="http://schemas.openxmlformats.org/presentationml/2006/main">
+  <p:cSld>
+    <p:spTree>
+      <p:nvGrpSpPr>
+        <p:cNvPr id="1" name=""/>
+        <p:cNvGrpSpPr/>
+        <p:nvPr/>
+      </p:nvGrpSpPr>
+      <p:grpSpPr>
+        <a:xfrm>
+          <a:off x="0" y="0"/>
+          <a:ext cx="0" cy="0"/>
+          <a:chOff x="0" y="0"/>
+          <a:chExt cx="0" cy="0"/>
+        </a:xfrm>
+      </p:grpSpPr>
+      <p:pic>
+        <p:nvPicPr>
+          <p:cNvPr id="1027" name="Picture 3"/>
+          <p:cNvPicPr>
+            <a:picLocks noChangeAspect="1" noChangeArrowheads="1"/>
+          </p:cNvPicPr>
+          <p:nvPr/>
+        </p:nvPicPr>
+        <p:blipFill>
+          <a:blip r:embed="rId2">
+            <a:extLst>
+              <a:ext uri="{28A0092B-C50C-407E-A947-70E740481C1C}">
+                <a14:useLocalDpi xmlns:a14="http://schemas.microsoft.com/office/drawing/2010/main" val="0"/>
+              </a:ext>
+            </a:extLst>
+          </a:blip>
+          <a:srcRect/>
+          <a:stretch>
+            <a:fillRect/>
+          </a:stretch>
+        </p:blipFill>
+        <p:spPr bwMode="auto">
+          <a:xfrm>
+            <a:off x="2809850" y="1119188"/>
+            <a:ext cx="3562350" cy="4619625"/>
+          </a:xfrm>
+          <a:prstGeom prst="rect">
+            <a:avLst/>
+          </a:prstGeom>
+          <a:noFill/>
+          <a:ln>
+            <a:noFill/>
+          </a:ln>
+          <a:effectLst/>
+          <a:extLst>
+            <a:ext uri="{909E8E84-426E-40DD-AFC4-6F175D3DCCD1}">
+              <a14:hiddenFill xmlns:a14="http://schemas.microsoft.com/office/drawing/2010/main">
+                <a:solidFill>
+                  <a:schemeClr val="accent1"/>
+                </a:solidFill>
+              </a14:hiddenFill>
+            </a:ext>
+            <a:ext uri="{91240B29-F687-4F45-9708-019B960494DF}">
+              <a14:hiddenLine xmlns:a14="http://schemas.microsoft.com/office/drawing/2010/main" w="9525">
+                <a:solidFill>
+                  <a:schemeClr val="tx1"/>
+                </a:solidFill>
+                <a:miter lim="800000"/>
+                <a:headEnd/>
+                <a:tailEnd/>
+              </a14:hiddenLine>
+            </a:ext>
+            <a:ext uri="{AF507438-7753-43E0-B8FC-AC1667EBCBE1}">
+              <a14:hiddenEffects xmlns:a14="http://schemas.microsoft.com/office/drawing/2010/main">
+                <a:effectLst>
+                  <a:outerShdw dist="35921" dir="2700000" algn="ctr" rotWithShape="0">
+                    <a:schemeClr val="bg2"/>
+                  </a:outerShdw>
+                </a:effectLst>
+              </a14:hiddenEffects>
+            </a:ext>
+          </a:extLst>
+        </p:spPr>
+      </p:pic>
+      <p:pic>
+        <p:nvPicPr>
+          <p:cNvPr id="1026" name="Picture 2"/>
+          <p:cNvPicPr>
+            <a:picLocks noChangeAspect="1" noChangeArrowheads="1"/>
+          </p:cNvPicPr>
+          <p:nvPr/>
+        </p:nvPicPr>
+        <p:blipFill>
+          <a:blip r:embed="rId3">
+            <a:extLst>
+              <a:ext uri="{28A0092B-C50C-407E-A947-70E740481C1C}">
+                <a14:useLocalDpi xmlns:a14="http://schemas.microsoft.com/office/drawing/2010/main" val="0"/>
+              </a:ext>
+            </a:extLst>
+          </a:blip>
+          <a:srcRect/>
+          <a:stretch>
+            <a:fillRect/>
+          </a:stretch>
+        </p:blipFill>
+        <p:spPr bwMode="auto">
+          <a:xfrm>
+            <a:off x="-36512" y="1119188"/>
+            <a:ext cx="3562350" cy="4619625"/>
+          </a:xfrm>
+          <a:prstGeom prst="rect">
+            <a:avLst/>
+          </a:prstGeom>
+          <a:noFill/>
+          <a:ln>
+            <a:noFill/>
+          </a:ln>
+          <a:effectLst/>
+          <a:extLst>
+            <a:ext uri="{909E8E84-426E-40DD-AFC4-6F175D3DCCD1}">
+              <a14:hiddenFill xmlns:a14="http://schemas.microsoft.com/office/drawing/2010/main">
+                <a:solidFill>
+                  <a:schemeClr val="accent1"/>
+                </a:solidFill>
+              </a14:hiddenFill>
+            </a:ext>
+            <a:ext uri="{91240B29-F687-4F45-9708-019B960494DF}">
+              <a14:hiddenLine xmlns:a14="http://schemas.microsoft.com/office/drawing/2010/main" w="9525">
+                <a:solidFill>
+                  <a:schemeClr val="tx1"/>
+                </a:solidFill>
+                <a:miter lim="800000"/>
+                <a:headEnd/>
+                <a:tailEnd/>
+              </a14:hiddenLine>
+            </a:ext>
+            <a:ext uri="{AF507438-7753-43E0-B8FC-AC1667EBCBE1}">
+              <a14:hiddenEffects xmlns:a14="http://schemas.microsoft.com/office/drawing/2010/main">
+                <a:effectLst>
+                  <a:outerShdw dist="35921" dir="2700000" algn="ctr" rotWithShape="0">
+                    <a:schemeClr val="bg2"/>
+                  </a:outerShdw>
+                </a:effectLst>
+              </a14:hiddenEffects>
+            </a:ext>
+          </a:extLst>
+        </p:spPr>
+      </p:pic>
+      <p:pic>
+        <p:nvPicPr>
+          <p:cNvPr id="1028" name="Picture 4"/>
+          <p:cNvPicPr>
+            <a:picLocks noChangeAspect="1" noChangeArrowheads="1"/>
+          </p:cNvPicPr>
+          <p:nvPr/>
+        </p:nvPicPr>
+        <p:blipFill>
+          <a:blip r:embed="rId4">
+            <a:extLst>
+              <a:ext uri="{28A0092B-C50C-407E-A947-70E740481C1C}">
+                <a14:useLocalDpi xmlns:a14="http://schemas.microsoft.com/office/drawing/2010/main" val="0"/>
+              </a:ext>
+            </a:extLst>
+          </a:blip>
+          <a:srcRect/>
+          <a:stretch>
+            <a:fillRect/>
+          </a:stretch>
+        </p:blipFill>
+        <p:spPr bwMode="auto">
+          <a:xfrm>
+            <a:off x="5834186" y="1119188"/>
+            <a:ext cx="3562350" cy="4619625"/>
+          </a:xfrm>
+          <a:prstGeom prst="rect">
+            <a:avLst/>
+          </a:prstGeom>
+          <a:noFill/>
+          <a:ln>
+            <a:noFill/>
+          </a:ln>
+          <a:effectLst/>
+          <a:extLst>
+            <a:ext uri="{909E8E84-426E-40DD-AFC4-6F175D3DCCD1}">
+              <a14:hiddenFill xmlns:a14="http://schemas.microsoft.com/office/drawing/2010/main">
+                <a:solidFill>
+                  <a:schemeClr val="accent1"/>
+                </a:solidFill>
+              </a14:hiddenFill>
+            </a:ext>
+            <a:ext uri="{91240B29-F687-4F45-9708-019B960494DF}">
+              <a14:hiddenLine xmlns:a14="http://schemas.microsoft.com/office/drawing/2010/main" w="9525">
+                <a:solidFill>
+                  <a:schemeClr val="tx1"/>
+                </a:solidFill>
+                <a:miter lim="800000"/>
+                <a:headEnd/>
+                <a:tailEnd/>
+              </a14:hiddenLine>
+            </a:ext>
+            <a:ext uri="{AF507438-7753-43E0-B8FC-AC1667EBCBE1}">
+              <a14:hiddenEffects xmlns:a14="http://schemas.microsoft.com/office/drawing/2010/main">
+                <a:effectLst>
+                  <a:outerShdw dist="35921" dir="2700000" algn="ctr" rotWithShape="0">
+                    <a:schemeClr val="bg2"/>
+                  </a:outerShdw>
+                </a:effectLst>
+              </a14:hiddenEffects>
+            </a:ext>
+          </a:extLst>
+        </p:spPr>
+      </p:pic>
+      <p:sp>
+        <p:nvSpPr>
+          <p:cNvPr id="2" name="1 CuadroTexto"/>
+          <p:cNvSpPr txBox="1"/>
+          <p:nvPr/>
+        </p:nvSpPr>
+        <p:spPr>
+          <a:xfrm>
+            <a:off x="1259632" y="1119188"/>
+            <a:ext cx="1550218" cy="369332"/>
+          </a:xfrm>
+          <a:prstGeom prst="rect">
+            <a:avLst/>
+          </a:prstGeom>
+          <a:noFill/>
+        </p:spPr>
+        <p:txBody>
+          <a:bodyPr wrap="square" rtlCol="0">
+            <a:spAutoFit/>
+          </a:bodyPr>
+          <a:lstStyle/>
+          <a:p>
+            <a:r>
+              <a:rPr lang="en-US" b="1" dirty="0" smtClean="0"/>
+              <a:t>Theta 2</a:t>
+            </a:r>
+            <a:endParaRPr lang="en-US" b="1" dirty="0"/>
+          </a:p>
+        </p:txBody>
+      </p:sp>
+      <p:sp>
+        <p:nvSpPr>
+          <p:cNvPr id="6" name="5 CuadroTexto"/>
+          <p:cNvSpPr txBox="1"/>
+          <p:nvPr/>
+        </p:nvSpPr>
+        <p:spPr>
+          <a:xfrm>
+            <a:off x="4101902" y="1115452"/>
+            <a:ext cx="1550218" cy="369332"/>
+          </a:xfrm>
+          <a:prstGeom prst="rect">
+            <a:avLst/>
+          </a:prstGeom>
+          <a:noFill/>
+        </p:spPr>
+        <p:txBody>
+          <a:bodyPr wrap="square" rtlCol="0">
+            <a:spAutoFit/>
+          </a:bodyPr>
+          <a:lstStyle/>
+          <a:p>
+            <a:r>
+              <a:rPr lang="en-US" b="1" dirty="0" smtClean="0"/>
+              <a:t>Theta 10</a:t>
+            </a:r>
+            <a:endParaRPr lang="en-US" b="1" dirty="0"/>
+          </a:p>
+        </p:txBody>
+      </p:sp>
+      <p:sp>
+        <p:nvSpPr>
+          <p:cNvPr id="7" name="6 CuadroTexto"/>
+          <p:cNvSpPr txBox="1"/>
+          <p:nvPr/>
+        </p:nvSpPr>
+        <p:spPr>
+          <a:xfrm>
+            <a:off x="7054230" y="1110889"/>
+            <a:ext cx="1550218" cy="369332"/>
+          </a:xfrm>
+          <a:prstGeom prst="rect">
+            <a:avLst/>
+          </a:prstGeom>
+          <a:noFill/>
+        </p:spPr>
+        <p:txBody>
+          <a:bodyPr wrap="square" rtlCol="0">
+            <a:spAutoFit/>
+          </a:bodyPr>
+          <a:lstStyle/>
+          <a:p>
+            <a:r>
+              <a:rPr lang="en-US" b="1" dirty="0" smtClean="0"/>
+              <a:t>Theta 20</a:t>
+            </a:r>
+            <a:endParaRPr lang="en-US" b="1" dirty="0"/>
+          </a:p>
+        </p:txBody>
+      </p:sp>
+      <p:sp>
+        <p:nvSpPr>
+          <p:cNvPr id="3" name="2 CuadroTexto"/>
+          <p:cNvSpPr txBox="1"/>
+          <p:nvPr/>
+        </p:nvSpPr>
+        <p:spPr>
+          <a:xfrm>
+            <a:off x="727866" y="332656"/>
+            <a:ext cx="7704856" cy="400110"/>
+          </a:xfrm>
+          <a:prstGeom prst="rect">
+            <a:avLst/>
+          </a:prstGeom>
+          <a:noFill/>
+        </p:spPr>
+        <p:txBody>
+          <a:bodyPr wrap="square" rtlCol="0">
+            <a:spAutoFit/>
+          </a:bodyPr>
+          <a:lstStyle/>
+          <a:p>
+            <a:pPr algn="ctr"/>
+            <a:r>
+              <a:rPr lang="en-US" sz="2000" b="1" dirty="0" smtClean="0"/>
+              <a:t>Distribution of segregating sites in the simulated populations</a:t>
+            </a:r>
+            <a:endParaRPr lang="en-US" sz="2000" b="1" dirty="0"/>
+          </a:p>
+        </p:txBody>
+      </p:sp>
+    </p:spTree>
+    <p:extLst>
+      <p:ext uri="{BB962C8B-B14F-4D97-AF65-F5344CB8AC3E}">
+        <p14:creationId xmlns:p14="http://schemas.microsoft.com/office/powerpoint/2010/main" val="2288134770"/>
+      </p:ext>
+    </p:extLst>
+  </p:cSld>
+  <p:clrMapOvr>
+    <a:masterClrMapping/>
+  </p:clrMapOvr>
+  <p:timing>
+    <p:tnLst>
+      <p:par>
+        <p:cTn id="1" dur="indefinite" restart="never" nodeType="tmRoot"/>
+      </p:par>
+    </p:tnLst>
+  </p:timing>
+</p:sld>
+</file>
+
+<file path=ppt/slides/slide8.xml><?xml version="1.0" encoding="utf-8"?>
+<p:sld xmlns:a="http://schemas.openxmlformats.org/drawingml/2006/main" xmlns:r="http://schemas.openxmlformats.org/officeDocument/2006/relationships" xmlns:p="http://schemas.openxmlformats.org/presentationml/2006/main">
+  <p:cSld>
+    <p:spTree>
+      <p:nvGrpSpPr>
+        <p:cNvPr id="1" name=""/>
+        <p:cNvGrpSpPr/>
+        <p:nvPr/>
+      </p:nvGrpSpPr>
+      <p:grpSpPr>
+        <a:xfrm>
+          <a:off x="0" y="0"/>
+          <a:ext cx="0" cy="0"/>
+          <a:chOff x="0" y="0"/>
+          <a:chExt cx="0" cy="0"/>
+        </a:xfrm>
+      </p:grpSpPr>
+      <p:pic>
+        <p:nvPicPr>
+          <p:cNvPr id="1028" name="Picture 4"/>
+          <p:cNvPicPr>
+            <a:picLocks noChangeAspect="1" noChangeArrowheads="1"/>
+          </p:cNvPicPr>
+          <p:nvPr/>
+        </p:nvPicPr>
+        <p:blipFill>
+          <a:blip r:embed="rId2">
+            <a:extLst>
+              <a:ext uri="{28A0092B-C50C-407E-A947-70E740481C1C}">
+                <a14:useLocalDpi xmlns:a14="http://schemas.microsoft.com/office/drawing/2010/main" val="0"/>
+              </a:ext>
+            </a:extLst>
+          </a:blip>
+          <a:srcRect/>
+          <a:stretch>
+            <a:fillRect/>
+          </a:stretch>
+        </p:blipFill>
+        <p:spPr bwMode="auto">
+          <a:xfrm>
+            <a:off x="5546154" y="1119188"/>
+            <a:ext cx="3562350" cy="4619625"/>
+          </a:xfrm>
+          <a:prstGeom prst="rect">
+            <a:avLst/>
+          </a:prstGeom>
+          <a:noFill/>
+          <a:ln>
+            <a:noFill/>
+          </a:ln>
+          <a:effectLst/>
+          <a:extLst>
+            <a:ext uri="{909E8E84-426E-40DD-AFC4-6F175D3DCCD1}">
+              <a14:hiddenFill xmlns:a14="http://schemas.microsoft.com/office/drawing/2010/main">
+                <a:solidFill>
+                  <a:schemeClr val="accent1"/>
+                </a:solidFill>
+              </a14:hiddenFill>
+            </a:ext>
+            <a:ext uri="{91240B29-F687-4F45-9708-019B960494DF}">
+              <a14:hiddenLine xmlns:a14="http://schemas.microsoft.com/office/drawing/2010/main" w="9525">
+                <a:solidFill>
+                  <a:schemeClr val="tx1"/>
+                </a:solidFill>
+                <a:miter lim="800000"/>
+                <a:headEnd/>
+                <a:tailEnd/>
+              </a14:hiddenLine>
+            </a:ext>
+            <a:ext uri="{AF507438-7753-43E0-B8FC-AC1667EBCBE1}">
+              <a14:hiddenEffects xmlns:a14="http://schemas.microsoft.com/office/drawing/2010/main">
+                <a:effectLst>
+                  <a:outerShdw dist="35921" dir="2700000" algn="ctr" rotWithShape="0">
+                    <a:schemeClr val="bg2"/>
+                  </a:outerShdw>
+                </a:effectLst>
+              </a14:hiddenEffects>
+            </a:ext>
+          </a:extLst>
+        </p:spPr>
+      </p:pic>
+      <p:pic>
+        <p:nvPicPr>
+          <p:cNvPr id="1029" name="Picture 5"/>
+          <p:cNvPicPr>
+            <a:picLocks noChangeAspect="1" noChangeArrowheads="1"/>
+          </p:cNvPicPr>
+          <p:nvPr/>
+        </p:nvPicPr>
+        <p:blipFill>
+          <a:blip r:embed="rId3">
+            <a:extLst>
+              <a:ext uri="{28A0092B-C50C-407E-A947-70E740481C1C}">
+                <a14:useLocalDpi xmlns:a14="http://schemas.microsoft.com/office/drawing/2010/main" val="0"/>
+              </a:ext>
+            </a:extLst>
+          </a:blip>
+          <a:srcRect/>
+          <a:stretch>
+            <a:fillRect/>
+          </a:stretch>
+        </p:blipFill>
+        <p:spPr bwMode="auto">
+          <a:xfrm>
+            <a:off x="2790825" y="1119188"/>
+            <a:ext cx="3562350" cy="4619625"/>
+          </a:xfrm>
+          <a:prstGeom prst="rect">
+            <a:avLst/>
+          </a:prstGeom>
+          <a:noFill/>
+          <a:ln>
+            <a:noFill/>
+          </a:ln>
+          <a:effectLst/>
+          <a:extLst>
+            <a:ext uri="{909E8E84-426E-40DD-AFC4-6F175D3DCCD1}">
+              <a14:hiddenFill xmlns:a14="http://schemas.microsoft.com/office/drawing/2010/main">
+                <a:solidFill>
+                  <a:schemeClr val="accent1"/>
+                </a:solidFill>
+              </a14:hiddenFill>
+            </a:ext>
+            <a:ext uri="{91240B29-F687-4F45-9708-019B960494DF}">
+              <a14:hiddenLine xmlns:a14="http://schemas.microsoft.com/office/drawing/2010/main" w="9525">
+                <a:solidFill>
+                  <a:schemeClr val="tx1"/>
+                </a:solidFill>
+                <a:miter lim="800000"/>
+                <a:headEnd/>
+                <a:tailEnd/>
+              </a14:hiddenLine>
+            </a:ext>
+            <a:ext uri="{AF507438-7753-43E0-B8FC-AC1667EBCBE1}">
+              <a14:hiddenEffects xmlns:a14="http://schemas.microsoft.com/office/drawing/2010/main">
+                <a:effectLst>
+                  <a:outerShdw dist="35921" dir="2700000" algn="ctr" rotWithShape="0">
+                    <a:schemeClr val="bg2"/>
+                  </a:outerShdw>
+                </a:effectLst>
+              </a14:hiddenEffects>
+            </a:ext>
+          </a:extLst>
+        </p:spPr>
+      </p:pic>
+      <p:pic>
+        <p:nvPicPr>
+          <p:cNvPr id="1030" name="Picture 6"/>
+          <p:cNvPicPr>
+            <a:picLocks noChangeAspect="1" noChangeArrowheads="1"/>
+          </p:cNvPicPr>
+          <p:nvPr/>
+        </p:nvPicPr>
+        <p:blipFill>
+          <a:blip r:embed="rId4">
+            <a:extLst>
+              <a:ext uri="{28A0092B-C50C-407E-A947-70E740481C1C}">
+                <a14:useLocalDpi xmlns:a14="http://schemas.microsoft.com/office/drawing/2010/main" val="0"/>
+              </a:ext>
+            </a:extLst>
+          </a:blip>
+          <a:srcRect/>
+          <a:stretch>
+            <a:fillRect/>
+          </a:stretch>
+        </p:blipFill>
+        <p:spPr bwMode="auto">
+          <a:xfrm>
+            <a:off x="-180528" y="1097034"/>
+            <a:ext cx="3562350" cy="4619625"/>
+          </a:xfrm>
+          <a:prstGeom prst="rect">
+            <a:avLst/>
+          </a:prstGeom>
+          <a:noFill/>
+          <a:ln>
+            <a:noFill/>
+          </a:ln>
+          <a:effectLst/>
+          <a:extLst>
+            <a:ext uri="{909E8E84-426E-40DD-AFC4-6F175D3DCCD1}">
+              <a14:hiddenFill xmlns:a14="http://schemas.microsoft.com/office/drawing/2010/main">
+                <a:solidFill>
+                  <a:schemeClr val="accent1"/>
+                </a:solidFill>
+              </a14:hiddenFill>
+            </a:ext>
+            <a:ext uri="{91240B29-F687-4F45-9708-019B960494DF}">
+              <a14:hiddenLine xmlns:a14="http://schemas.microsoft.com/office/drawing/2010/main" w="9525">
+                <a:solidFill>
+                  <a:schemeClr val="tx1"/>
+                </a:solidFill>
+                <a:miter lim="800000"/>
+                <a:headEnd/>
+                <a:tailEnd/>
+              </a14:hiddenLine>
+            </a:ext>
+            <a:ext uri="{AF507438-7753-43E0-B8FC-AC1667EBCBE1}">
+              <a14:hiddenEffects xmlns:a14="http://schemas.microsoft.com/office/drawing/2010/main">
+                <a:effectLst>
+                  <a:outerShdw dist="35921" dir="2700000" algn="ctr" rotWithShape="0">
+                    <a:schemeClr val="bg2"/>
+                  </a:outerShdw>
+                </a:effectLst>
+              </a14:hiddenEffects>
+            </a:ext>
+          </a:extLst>
+        </p:spPr>
+      </p:pic>
+      <p:sp>
+        <p:nvSpPr>
+          <p:cNvPr id="7" name="6 CuadroTexto"/>
+          <p:cNvSpPr txBox="1"/>
+          <p:nvPr/>
+        </p:nvSpPr>
+        <p:spPr>
+          <a:xfrm>
+            <a:off x="1259632" y="1119188"/>
+            <a:ext cx="1550218" cy="369332"/>
+          </a:xfrm>
+          <a:prstGeom prst="rect">
+            <a:avLst/>
+          </a:prstGeom>
+          <a:noFill/>
+        </p:spPr>
+        <p:txBody>
+          <a:bodyPr wrap="square" rtlCol="0">
+            <a:spAutoFit/>
+          </a:bodyPr>
+          <a:lstStyle/>
+          <a:p>
+            <a:r>
+              <a:rPr lang="en-US" b="1" dirty="0" smtClean="0"/>
+              <a:t>Theta 2</a:t>
+            </a:r>
+            <a:endParaRPr lang="en-US" b="1" dirty="0"/>
+          </a:p>
+        </p:txBody>
+      </p:sp>
+      <p:sp>
+        <p:nvSpPr>
+          <p:cNvPr id="8" name="7 CuadroTexto"/>
+          <p:cNvSpPr txBox="1"/>
+          <p:nvPr/>
+        </p:nvSpPr>
+        <p:spPr>
+          <a:xfrm>
+            <a:off x="4101902" y="1115452"/>
+            <a:ext cx="1550218" cy="369332"/>
+          </a:xfrm>
+          <a:prstGeom prst="rect">
+            <a:avLst/>
+          </a:prstGeom>
+          <a:noFill/>
+        </p:spPr>
+        <p:txBody>
+          <a:bodyPr wrap="square" rtlCol="0">
+            <a:spAutoFit/>
+          </a:bodyPr>
+          <a:lstStyle/>
+          <a:p>
+            <a:r>
+              <a:rPr lang="en-US" b="1" dirty="0" smtClean="0"/>
+              <a:t>Theta 10</a:t>
+            </a:r>
+            <a:endParaRPr lang="en-US" b="1" dirty="0"/>
+          </a:p>
+        </p:txBody>
+      </p:sp>
+      <p:sp>
+        <p:nvSpPr>
+          <p:cNvPr id="9" name="8 CuadroTexto"/>
+          <p:cNvSpPr txBox="1"/>
+          <p:nvPr/>
+        </p:nvSpPr>
+        <p:spPr>
+          <a:xfrm>
+            <a:off x="7054230" y="1110889"/>
+            <a:ext cx="1550218" cy="369332"/>
+          </a:xfrm>
+          <a:prstGeom prst="rect">
+            <a:avLst/>
+          </a:prstGeom>
+          <a:noFill/>
+        </p:spPr>
+        <p:txBody>
+          <a:bodyPr wrap="square" rtlCol="0">
+            <a:spAutoFit/>
+          </a:bodyPr>
+          <a:lstStyle/>
+          <a:p>
+            <a:r>
+              <a:rPr lang="en-US" b="1" dirty="0" smtClean="0"/>
+              <a:t>Theta 20</a:t>
+            </a:r>
+            <a:endParaRPr lang="en-US" b="1" dirty="0"/>
+          </a:p>
+        </p:txBody>
+      </p:sp>
+      <p:sp>
+        <p:nvSpPr>
+          <p:cNvPr id="10" name="9 CuadroTexto"/>
+          <p:cNvSpPr txBox="1"/>
+          <p:nvPr/>
+        </p:nvSpPr>
+        <p:spPr>
+          <a:xfrm>
+            <a:off x="727866" y="332656"/>
+            <a:ext cx="7704856" cy="400110"/>
+          </a:xfrm>
+          <a:prstGeom prst="rect">
+            <a:avLst/>
+          </a:prstGeom>
+          <a:noFill/>
+        </p:spPr>
+        <p:txBody>
+          <a:bodyPr wrap="square" rtlCol="0">
+            <a:spAutoFit/>
+          </a:bodyPr>
+          <a:lstStyle/>
+          <a:p>
+            <a:pPr algn="ctr"/>
+            <a:r>
+              <a:rPr lang="en-US" sz="2000" b="1" dirty="0" smtClean="0"/>
+              <a:t>Distribution of segregating sites in the simulated populations</a:t>
+            </a:r>
+            <a:endParaRPr lang="en-US" sz="2000" b="1" dirty="0"/>
+          </a:p>
+        </p:txBody>
+      </p:sp>
+    </p:spTree>
+    <p:extLst>
+      <p:ext uri="{BB962C8B-B14F-4D97-AF65-F5344CB8AC3E}">
+        <p14:creationId xmlns:p14="http://schemas.microsoft.com/office/powerpoint/2010/main" val="336628316"/>
+      </p:ext>
+    </p:extLst>
+  </p:cSld>
+  <p:clrMapOvr>
+    <a:masterClrMapping/>
+  </p:clrMapOvr>
+  <p:timing>
+    <p:tnLst>
+      <p:par>
+        <p:cTn id="1" dur="indefinite" restart="never" nodeType="tmRoot"/>
+      </p:par>
+    </p:tnLst>
+  </p:timing>
+</p:sld>
+</file>
+
+<file path=ppt/slides/slide9.xml><?xml version="1.0" encoding="utf-8"?>
+<p:sld xmlns:a="http://schemas.openxmlformats.org/drawingml/2006/main" xmlns:r="http://schemas.openxmlformats.org/officeDocument/2006/relationships" xmlns:p="http://schemas.openxmlformats.org/presentationml/2006/main">
+  <p:cSld>
+    <p:spTree>
+      <p:nvGrpSpPr>
+        <p:cNvPr id="1" name=""/>
+        <p:cNvGrpSpPr/>
+        <p:nvPr/>
+      </p:nvGrpSpPr>
+      <p:grpSpPr>
+        <a:xfrm>
+          <a:off x="0" y="0"/>
+          <a:ext cx="0" cy="0"/>
+          <a:chOff x="0" y="0"/>
+          <a:chExt cx="0" cy="0"/>
+        </a:xfrm>
+      </p:grpSpPr>
+      <p:sp>
+        <p:nvSpPr>
+          <p:cNvPr id="3" name="2 CuadroTexto"/>
+          <p:cNvSpPr txBox="1"/>
+          <p:nvPr/>
+        </p:nvSpPr>
+        <p:spPr>
+          <a:xfrm>
+            <a:off x="1259632" y="1119188"/>
+            <a:ext cx="1550218" cy="369332"/>
+          </a:xfrm>
+          <a:prstGeom prst="rect">
+            <a:avLst/>
+          </a:prstGeom>
+          <a:noFill/>
+        </p:spPr>
+        <p:txBody>
+          <a:bodyPr wrap="square" rtlCol="0">
+            <a:spAutoFit/>
+          </a:bodyPr>
+          <a:lstStyle/>
+          <a:p>
+            <a:r>
+              <a:rPr lang="en-US" b="1" dirty="0" smtClean="0"/>
+              <a:t>Theta 2</a:t>
+            </a:r>
+            <a:endParaRPr lang="en-US" b="1" dirty="0"/>
+          </a:p>
+        </p:txBody>
+      </p:sp>
+      <p:pic>
+        <p:nvPicPr>
+          <p:cNvPr id="2051" name="Picture 3"/>
+          <p:cNvPicPr>
+            <a:picLocks noChangeAspect="1" noChangeArrowheads="1"/>
+          </p:cNvPicPr>
+          <p:nvPr/>
+        </p:nvPicPr>
+        <p:blipFill>
+          <a:blip r:embed="rId2">
+            <a:extLst>
+              <a:ext uri="{28A0092B-C50C-407E-A947-70E740481C1C}">
+                <a14:useLocalDpi xmlns:a14="http://schemas.microsoft.com/office/drawing/2010/main" val="0"/>
+              </a:ext>
+            </a:extLst>
+          </a:blip>
+          <a:srcRect/>
+          <a:stretch>
+            <a:fillRect/>
+          </a:stretch>
+        </p:blipFill>
+        <p:spPr bwMode="auto">
+          <a:xfrm>
+            <a:off x="1566863" y="817563"/>
+            <a:ext cx="6010275" cy="5229225"/>
+          </a:xfrm>
+          <a:prstGeom prst="rect">
+            <a:avLst/>
+          </a:prstGeom>
+          <a:noFill/>
+          <a:ln>
+            <a:noFill/>
+          </a:ln>
+          <a:effectLst/>
+          <a:extLst>
+            <a:ext uri="{909E8E84-426E-40DD-AFC4-6F175D3DCCD1}">
+              <a14:hiddenFill xmlns:a14="http://schemas.microsoft.com/office/drawing/2010/main">
+                <a:solidFill>
+                  <a:schemeClr val="accent1"/>
+                </a:solidFill>
+              </a14:hiddenFill>
+            </a:ext>
+            <a:ext uri="{91240B29-F687-4F45-9708-019B960494DF}">
+              <a14:hiddenLine xmlns:a14="http://schemas.microsoft.com/office/drawing/2010/main" w="9525">
+                <a:solidFill>
+                  <a:schemeClr val="tx1"/>
+                </a:solidFill>
+                <a:miter lim="800000"/>
+                <a:headEnd/>
+                <a:tailEnd/>
+              </a14:hiddenLine>
+            </a:ext>
+            <a:ext uri="{AF507438-7753-43E0-B8FC-AC1667EBCBE1}">
+              <a14:hiddenEffects xmlns:a14="http://schemas.microsoft.com/office/drawing/2010/main">
+                <a:effectLst>
+                  <a:outerShdw dist="35921" dir="2700000" algn="ctr" rotWithShape="0">
+                    <a:schemeClr val="bg2"/>
+                  </a:outerShdw>
+                </a:effectLst>
+              </a14:hiddenEffects>
+            </a:ext>
+          </a:extLst>
+        </p:spPr>
+      </p:pic>
+    </p:spTree>
+    <p:extLst>
+      <p:ext uri="{BB962C8B-B14F-4D97-AF65-F5344CB8AC3E}">
+        <p14:creationId xmlns:p14="http://schemas.microsoft.com/office/powerpoint/2010/main" val="536557031"/>
+      </p:ext>
+    </p:extLst>
+  </p:cSld>
+  <p:clrMapOvr>
+    <a:masterClrMapping/>
+  </p:clrMapOvr>
 </p:sld>
 </file>
 

</xml_diff>

<commit_message>
new plot for Sampling Theory
</commit_message>
<xml_diff>
--- a/Figures draft for manuscript.pptx
+++ b/Figures draft for manuscript.pptx
@@ -299,7 +299,7 @@
           <a:p>
             <a:fld id="{C2957447-5BFD-4CE2-A5BA-15C06B9C0B91}" type="datetimeFigureOut">
               <a:rPr lang="en-US" smtClean="0"/>
-              <a:t>7/20/2015</a:t>
+              <a:t>7/24/2015</a:t>
             </a:fld>
             <a:endParaRPr lang="en-US"/>
           </a:p>
@@ -469,7 +469,7 @@
           <a:p>
             <a:fld id="{C2957447-5BFD-4CE2-A5BA-15C06B9C0B91}" type="datetimeFigureOut">
               <a:rPr lang="en-US" smtClean="0"/>
-              <a:t>7/20/2015</a:t>
+              <a:t>7/24/2015</a:t>
             </a:fld>
             <a:endParaRPr lang="en-US"/>
           </a:p>
@@ -649,7 +649,7 @@
           <a:p>
             <a:fld id="{C2957447-5BFD-4CE2-A5BA-15C06B9C0B91}" type="datetimeFigureOut">
               <a:rPr lang="en-US" smtClean="0"/>
-              <a:t>7/20/2015</a:t>
+              <a:t>7/24/2015</a:t>
             </a:fld>
             <a:endParaRPr lang="en-US"/>
           </a:p>
@@ -819,7 +819,7 @@
           <a:p>
             <a:fld id="{C2957447-5BFD-4CE2-A5BA-15C06B9C0B91}" type="datetimeFigureOut">
               <a:rPr lang="en-US" smtClean="0"/>
-              <a:t>7/20/2015</a:t>
+              <a:t>7/24/2015</a:t>
             </a:fld>
             <a:endParaRPr lang="en-US"/>
           </a:p>
@@ -1065,7 +1065,7 @@
           <a:p>
             <a:fld id="{C2957447-5BFD-4CE2-A5BA-15C06B9C0B91}" type="datetimeFigureOut">
               <a:rPr lang="en-US" smtClean="0"/>
-              <a:t>7/20/2015</a:t>
+              <a:t>7/24/2015</a:t>
             </a:fld>
             <a:endParaRPr lang="en-US"/>
           </a:p>
@@ -1353,7 +1353,7 @@
           <a:p>
             <a:fld id="{C2957447-5BFD-4CE2-A5BA-15C06B9C0B91}" type="datetimeFigureOut">
               <a:rPr lang="en-US" smtClean="0"/>
-              <a:t>7/20/2015</a:t>
+              <a:t>7/24/2015</a:t>
             </a:fld>
             <a:endParaRPr lang="en-US"/>
           </a:p>
@@ -1775,7 +1775,7 @@
           <a:p>
             <a:fld id="{C2957447-5BFD-4CE2-A5BA-15C06B9C0B91}" type="datetimeFigureOut">
               <a:rPr lang="en-US" smtClean="0"/>
-              <a:t>7/20/2015</a:t>
+              <a:t>7/24/2015</a:t>
             </a:fld>
             <a:endParaRPr lang="en-US"/>
           </a:p>
@@ -1893,7 +1893,7 @@
           <a:p>
             <a:fld id="{C2957447-5BFD-4CE2-A5BA-15C06B9C0B91}" type="datetimeFigureOut">
               <a:rPr lang="en-US" smtClean="0"/>
-              <a:t>7/20/2015</a:t>
+              <a:t>7/24/2015</a:t>
             </a:fld>
             <a:endParaRPr lang="en-US"/>
           </a:p>
@@ -1988,7 +1988,7 @@
           <a:p>
             <a:fld id="{C2957447-5BFD-4CE2-A5BA-15C06B9C0B91}" type="datetimeFigureOut">
               <a:rPr lang="en-US" smtClean="0"/>
-              <a:t>7/20/2015</a:t>
+              <a:t>7/24/2015</a:t>
             </a:fld>
             <a:endParaRPr lang="en-US"/>
           </a:p>
@@ -2265,7 +2265,7 @@
           <a:p>
             <a:fld id="{C2957447-5BFD-4CE2-A5BA-15C06B9C0B91}" type="datetimeFigureOut">
               <a:rPr lang="en-US" smtClean="0"/>
-              <a:t>7/20/2015</a:t>
+              <a:t>7/24/2015</a:t>
             </a:fld>
             <a:endParaRPr lang="en-US"/>
           </a:p>
@@ -2518,7 +2518,7 @@
           <a:p>
             <a:fld id="{C2957447-5BFD-4CE2-A5BA-15C06B9C0B91}" type="datetimeFigureOut">
               <a:rPr lang="en-US" smtClean="0"/>
-              <a:t>7/20/2015</a:t>
+              <a:t>7/24/2015</a:t>
             </a:fld>
             <a:endParaRPr lang="en-US"/>
           </a:p>
@@ -2731,7 +2731,7 @@
           <a:p>
             <a:fld id="{C2957447-5BFD-4CE2-A5BA-15C06B9C0B91}" type="datetimeFigureOut">
               <a:rPr lang="en-US" smtClean="0"/>
-              <a:t>7/20/2015</a:t>
+              <a:t>7/24/2015</a:t>
             </a:fld>
             <a:endParaRPr lang="en-US"/>
           </a:p>
@@ -3253,6 +3253,13 @@
   <p:clrMapOvr>
     <a:masterClrMapping/>
   </p:clrMapOvr>
+  <p:timing>
+    <p:tnLst>
+      <p:par>
+        <p:cTn id="1" dur="indefinite" restart="never" nodeType="tmRoot"/>
+      </p:par>
+    </p:tnLst>
+  </p:timing>
 </p:sld>
 </file>
 
@@ -3431,6 +3438,13 @@
   <p:clrMapOvr>
     <a:masterClrMapping/>
   </p:clrMapOvr>
+  <p:timing>
+    <p:tnLst>
+      <p:par>
+        <p:cTn id="1" dur="indefinite" restart="never" nodeType="tmRoot"/>
+      </p:par>
+    </p:tnLst>
+  </p:timing>
 </p:sld>
 </file>
 
@@ -3545,6 +3559,13 @@
   <p:clrMapOvr>
     <a:masterClrMapping/>
   </p:clrMapOvr>
+  <p:timing>
+    <p:tnLst>
+      <p:par>
+        <p:cTn id="1" dur="indefinite" restart="never" nodeType="tmRoot"/>
+      </p:par>
+    </p:tnLst>
+  </p:timing>
 </p:sld>
 </file>
 
@@ -29336,7 +29357,7 @@
         </p:nvSpPr>
         <p:spPr>
           <a:xfrm>
-            <a:off x="1259632" y="1119188"/>
+            <a:off x="1259632" y="332656"/>
             <a:ext cx="1550218" cy="369332"/>
           </a:xfrm>
           <a:prstGeom prst="rect">
@@ -29432,6 +29453,13 @@
   <p:clrMapOvr>
     <a:masterClrMapping/>
   </p:clrMapOvr>
+  <p:timing>
+    <p:tnLst>
+      <p:par>
+        <p:cTn id="1" dur="indefinite" restart="never" nodeType="tmRoot"/>
+      </p:par>
+    </p:tnLst>
+  </p:timing>
 </p:sld>
 </file>
 

</xml_diff>

<commit_message>
working in the ms mostly methods
And moving old files to folders to clean up a little bit.
</commit_message>
<xml_diff>
--- a/Figures draft for manuscript.pptx
+++ b/Figures draft for manuscript.pptx
@@ -6,17 +6,17 @@
   </p:sldMasterIdLst>
   <p:sldIdLst>
     <p:sldId id="256" r:id="rId2"/>
-    <p:sldId id="257" r:id="rId3"/>
-    <p:sldId id="258" r:id="rId4"/>
-    <p:sldId id="261" r:id="rId5"/>
-    <p:sldId id="259" r:id="rId6"/>
-    <p:sldId id="260" r:id="rId7"/>
-    <p:sldId id="262" r:id="rId8"/>
-    <p:sldId id="263" r:id="rId9"/>
-    <p:sldId id="264" r:id="rId10"/>
-    <p:sldId id="265" r:id="rId11"/>
-    <p:sldId id="266" r:id="rId12"/>
-    <p:sldId id="267" r:id="rId13"/>
+    <p:sldId id="258" r:id="rId3"/>
+    <p:sldId id="259" r:id="rId4"/>
+    <p:sldId id="260" r:id="rId5"/>
+    <p:sldId id="262" r:id="rId6"/>
+    <p:sldId id="263" r:id="rId7"/>
+    <p:sldId id="264" r:id="rId8"/>
+    <p:sldId id="265" r:id="rId9"/>
+    <p:sldId id="266" r:id="rId10"/>
+    <p:sldId id="267" r:id="rId11"/>
+    <p:sldId id="268" r:id="rId12"/>
+    <p:sldId id="257" r:id="rId13"/>
   </p:sldIdLst>
   <p:sldSz cx="9144000" cy="6858000" type="screen4x3"/>
   <p:notesSz cx="6858000" cy="9144000"/>
@@ -299,7 +299,7 @@
           <a:p>
             <a:fld id="{C2957447-5BFD-4CE2-A5BA-15C06B9C0B91}" type="datetimeFigureOut">
               <a:rPr lang="en-US" smtClean="0"/>
-              <a:t>7/24/2015</a:t>
+              <a:t>8/12/2015</a:t>
             </a:fld>
             <a:endParaRPr lang="en-US"/>
           </a:p>
@@ -469,7 +469,7 @@
           <a:p>
             <a:fld id="{C2957447-5BFD-4CE2-A5BA-15C06B9C0B91}" type="datetimeFigureOut">
               <a:rPr lang="en-US" smtClean="0"/>
-              <a:t>7/24/2015</a:t>
+              <a:t>8/12/2015</a:t>
             </a:fld>
             <a:endParaRPr lang="en-US"/>
           </a:p>
@@ -649,7 +649,7 @@
           <a:p>
             <a:fld id="{C2957447-5BFD-4CE2-A5BA-15C06B9C0B91}" type="datetimeFigureOut">
               <a:rPr lang="en-US" smtClean="0"/>
-              <a:t>7/24/2015</a:t>
+              <a:t>8/12/2015</a:t>
             </a:fld>
             <a:endParaRPr lang="en-US"/>
           </a:p>
@@ -819,7 +819,7 @@
           <a:p>
             <a:fld id="{C2957447-5BFD-4CE2-A5BA-15C06B9C0B91}" type="datetimeFigureOut">
               <a:rPr lang="en-US" smtClean="0"/>
-              <a:t>7/24/2015</a:t>
+              <a:t>8/12/2015</a:t>
             </a:fld>
             <a:endParaRPr lang="en-US"/>
           </a:p>
@@ -1065,7 +1065,7 @@
           <a:p>
             <a:fld id="{C2957447-5BFD-4CE2-A5BA-15C06B9C0B91}" type="datetimeFigureOut">
               <a:rPr lang="en-US" smtClean="0"/>
-              <a:t>7/24/2015</a:t>
+              <a:t>8/12/2015</a:t>
             </a:fld>
             <a:endParaRPr lang="en-US"/>
           </a:p>
@@ -1353,7 +1353,7 @@
           <a:p>
             <a:fld id="{C2957447-5BFD-4CE2-A5BA-15C06B9C0B91}" type="datetimeFigureOut">
               <a:rPr lang="en-US" smtClean="0"/>
-              <a:t>7/24/2015</a:t>
+              <a:t>8/12/2015</a:t>
             </a:fld>
             <a:endParaRPr lang="en-US"/>
           </a:p>
@@ -1775,7 +1775,7 @@
           <a:p>
             <a:fld id="{C2957447-5BFD-4CE2-A5BA-15C06B9C0B91}" type="datetimeFigureOut">
               <a:rPr lang="en-US" smtClean="0"/>
-              <a:t>7/24/2015</a:t>
+              <a:t>8/12/2015</a:t>
             </a:fld>
             <a:endParaRPr lang="en-US"/>
           </a:p>
@@ -1893,7 +1893,7 @@
           <a:p>
             <a:fld id="{C2957447-5BFD-4CE2-A5BA-15C06B9C0B91}" type="datetimeFigureOut">
               <a:rPr lang="en-US" smtClean="0"/>
-              <a:t>7/24/2015</a:t>
+              <a:t>8/12/2015</a:t>
             </a:fld>
             <a:endParaRPr lang="en-US"/>
           </a:p>
@@ -1988,7 +1988,7 @@
           <a:p>
             <a:fld id="{C2957447-5BFD-4CE2-A5BA-15C06B9C0B91}" type="datetimeFigureOut">
               <a:rPr lang="en-US" smtClean="0"/>
-              <a:t>7/24/2015</a:t>
+              <a:t>8/12/2015</a:t>
             </a:fld>
             <a:endParaRPr lang="en-US"/>
           </a:p>
@@ -2265,7 +2265,7 @@
           <a:p>
             <a:fld id="{C2957447-5BFD-4CE2-A5BA-15C06B9C0B91}" type="datetimeFigureOut">
               <a:rPr lang="en-US" smtClean="0"/>
-              <a:t>7/24/2015</a:t>
+              <a:t>8/12/2015</a:t>
             </a:fld>
             <a:endParaRPr lang="en-US"/>
           </a:p>
@@ -2518,7 +2518,7 @@
           <a:p>
             <a:fld id="{C2957447-5BFD-4CE2-A5BA-15C06B9C0B91}" type="datetimeFigureOut">
               <a:rPr lang="en-US" smtClean="0"/>
-              <a:t>7/24/2015</a:t>
+              <a:t>8/12/2015</a:t>
             </a:fld>
             <a:endParaRPr lang="en-US"/>
           </a:p>
@@ -2731,7 +2731,7 @@
           <a:p>
             <a:fld id="{C2957447-5BFD-4CE2-A5BA-15C06B9C0B91}" type="datetimeFigureOut">
               <a:rPr lang="en-US" smtClean="0"/>
-              <a:t>7/24/2015</a:t>
+              <a:t>8/12/2015</a:t>
             </a:fld>
             <a:endParaRPr lang="en-US"/>
           </a:p>
@@ -3191,282 +3191,6 @@
       </p:grpSpPr>
       <p:pic>
         <p:nvPicPr>
-          <p:cNvPr id="3074" name="Picture 2"/>
-          <p:cNvPicPr>
-            <a:picLocks noChangeAspect="1" noChangeArrowheads="1"/>
-          </p:cNvPicPr>
-          <p:nvPr/>
-        </p:nvPicPr>
-        <p:blipFill>
-          <a:blip r:embed="rId2">
-            <a:extLst>
-              <a:ext uri="{28A0092B-C50C-407E-A947-70E740481C1C}">
-                <a14:useLocalDpi xmlns:a14="http://schemas.microsoft.com/office/drawing/2010/main" val="0"/>
-              </a:ext>
-            </a:extLst>
-          </a:blip>
-          <a:srcRect/>
-          <a:stretch>
-            <a:fillRect/>
-          </a:stretch>
-        </p:blipFill>
-        <p:spPr bwMode="auto">
-          <a:xfrm>
-            <a:off x="1676400" y="2328863"/>
-            <a:ext cx="5791200" cy="2200275"/>
-          </a:xfrm>
-          <a:prstGeom prst="rect">
-            <a:avLst/>
-          </a:prstGeom>
-          <a:noFill/>
-          <a:ln>
-            <a:noFill/>
-          </a:ln>
-          <a:extLst>
-            <a:ext uri="{909E8E84-426E-40DD-AFC4-6F175D3DCCD1}">
-              <a14:hiddenFill xmlns:a14="http://schemas.microsoft.com/office/drawing/2010/main">
-                <a:solidFill>
-                  <a:schemeClr val="accent1"/>
-                </a:solidFill>
-              </a14:hiddenFill>
-            </a:ext>
-            <a:ext uri="{91240B29-F687-4F45-9708-019B960494DF}">
-              <a14:hiddenLine xmlns:a14="http://schemas.microsoft.com/office/drawing/2010/main" w="9525">
-                <a:solidFill>
-                  <a:schemeClr val="tx1"/>
-                </a:solidFill>
-                <a:miter lim="800000"/>
-                <a:headEnd/>
-                <a:tailEnd/>
-              </a14:hiddenLine>
-            </a:ext>
-          </a:extLst>
-        </p:spPr>
-      </p:pic>
-    </p:spTree>
-    <p:extLst>
-      <p:ext uri="{BB962C8B-B14F-4D97-AF65-F5344CB8AC3E}">
-        <p14:creationId xmlns:p14="http://schemas.microsoft.com/office/powerpoint/2010/main" val="1767875964"/>
-      </p:ext>
-    </p:extLst>
-  </p:cSld>
-  <p:clrMapOvr>
-    <a:masterClrMapping/>
-  </p:clrMapOvr>
-  <p:timing>
-    <p:tnLst>
-      <p:par>
-        <p:cTn id="1" dur="indefinite" restart="never" nodeType="tmRoot"/>
-      </p:par>
-    </p:tnLst>
-  </p:timing>
-</p:sld>
-</file>
-
-<file path=ppt/slides/slide11.xml><?xml version="1.0" encoding="utf-8"?>
-<p:sld xmlns:a="http://schemas.openxmlformats.org/drawingml/2006/main" xmlns:r="http://schemas.openxmlformats.org/officeDocument/2006/relationships" xmlns:p="http://schemas.openxmlformats.org/presentationml/2006/main">
-  <p:cSld>
-    <p:spTree>
-      <p:nvGrpSpPr>
-        <p:cNvPr id="1" name=""/>
-        <p:cNvGrpSpPr/>
-        <p:nvPr/>
-      </p:nvGrpSpPr>
-      <p:grpSpPr>
-        <a:xfrm>
-          <a:off x="0" y="0"/>
-          <a:ext cx="0" cy="0"/>
-          <a:chOff x="0" y="0"/>
-          <a:chExt cx="0" cy="0"/>
-        </a:xfrm>
-      </p:grpSpPr>
-      <p:pic>
-        <p:nvPicPr>
-          <p:cNvPr id="5122" name="Picture 2"/>
-          <p:cNvPicPr>
-            <a:picLocks noChangeAspect="1" noChangeArrowheads="1"/>
-          </p:cNvPicPr>
-          <p:nvPr/>
-        </p:nvPicPr>
-        <p:blipFill>
-          <a:blip r:embed="rId2">
-            <a:extLst>
-              <a:ext uri="{28A0092B-C50C-407E-A947-70E740481C1C}">
-                <a14:useLocalDpi xmlns:a14="http://schemas.microsoft.com/office/drawing/2010/main" val="0"/>
-              </a:ext>
-            </a:extLst>
-          </a:blip>
-          <a:srcRect/>
-          <a:stretch>
-            <a:fillRect/>
-          </a:stretch>
-        </p:blipFill>
-        <p:spPr bwMode="auto">
-          <a:xfrm>
-            <a:off x="1566863" y="1217613"/>
-            <a:ext cx="6010275" cy="4429125"/>
-          </a:xfrm>
-          <a:prstGeom prst="rect">
-            <a:avLst/>
-          </a:prstGeom>
-          <a:noFill/>
-          <a:ln>
-            <a:noFill/>
-          </a:ln>
-          <a:effectLst/>
-          <a:extLst>
-            <a:ext uri="{909E8E84-426E-40DD-AFC4-6F175D3DCCD1}">
-              <a14:hiddenFill xmlns:a14="http://schemas.microsoft.com/office/drawing/2010/main">
-                <a:solidFill>
-                  <a:schemeClr val="accent1"/>
-                </a:solidFill>
-              </a14:hiddenFill>
-            </a:ext>
-            <a:ext uri="{91240B29-F687-4F45-9708-019B960494DF}">
-              <a14:hiddenLine xmlns:a14="http://schemas.microsoft.com/office/drawing/2010/main" w="9525">
-                <a:solidFill>
-                  <a:schemeClr val="tx1"/>
-                </a:solidFill>
-                <a:miter lim="800000"/>
-                <a:headEnd/>
-                <a:tailEnd/>
-              </a14:hiddenLine>
-            </a:ext>
-            <a:ext uri="{AF507438-7753-43E0-B8FC-AC1667EBCBE1}">
-              <a14:hiddenEffects xmlns:a14="http://schemas.microsoft.com/office/drawing/2010/main">
-                <a:effectLst>
-                  <a:outerShdw dist="35921" dir="2700000" algn="ctr" rotWithShape="0">
-                    <a:schemeClr val="bg2"/>
-                  </a:outerShdw>
-                </a:effectLst>
-              </a14:hiddenEffects>
-            </a:ext>
-          </a:extLst>
-        </p:spPr>
-      </p:pic>
-      <p:sp>
-        <p:nvSpPr>
-          <p:cNvPr id="2" name="1 CuadroTexto"/>
-          <p:cNvSpPr txBox="1"/>
-          <p:nvPr/>
-        </p:nvSpPr>
-        <p:spPr>
-          <a:xfrm>
-            <a:off x="2483768" y="404664"/>
-            <a:ext cx="3672408" cy="369332"/>
-          </a:xfrm>
-          <a:prstGeom prst="rect">
-            <a:avLst/>
-          </a:prstGeom>
-          <a:noFill/>
-        </p:spPr>
-        <p:txBody>
-          <a:bodyPr wrap="square" rtlCol="0">
-            <a:spAutoFit/>
-          </a:bodyPr>
-          <a:lstStyle/>
-          <a:p>
-            <a:r>
-              <a:rPr lang="en-US" dirty="0" smtClean="0"/>
-              <a:t>Theta two, n=2</a:t>
-            </a:r>
-            <a:endParaRPr lang="en-US" dirty="0"/>
-          </a:p>
-        </p:txBody>
-      </p:sp>
-      <p:pic>
-        <p:nvPicPr>
-          <p:cNvPr id="5123" name="Picture 3"/>
-          <p:cNvPicPr>
-            <a:picLocks noChangeAspect="1" noChangeArrowheads="1"/>
-          </p:cNvPicPr>
-          <p:nvPr/>
-        </p:nvPicPr>
-        <p:blipFill>
-          <a:blip r:embed="rId3">
-            <a:extLst>
-              <a:ext uri="{28A0092B-C50C-407E-A947-70E740481C1C}">
-                <a14:useLocalDpi xmlns:a14="http://schemas.microsoft.com/office/drawing/2010/main" val="0"/>
-              </a:ext>
-            </a:extLst>
-          </a:blip>
-          <a:srcRect/>
-          <a:stretch>
-            <a:fillRect/>
-          </a:stretch>
-        </p:blipFill>
-        <p:spPr bwMode="auto">
-          <a:xfrm>
-            <a:off x="1719263" y="1366838"/>
-            <a:ext cx="6010275" cy="4429125"/>
-          </a:xfrm>
-          <a:prstGeom prst="rect">
-            <a:avLst/>
-          </a:prstGeom>
-          <a:noFill/>
-          <a:ln>
-            <a:noFill/>
-          </a:ln>
-          <a:extLst>
-            <a:ext uri="{909E8E84-426E-40DD-AFC4-6F175D3DCCD1}">
-              <a14:hiddenFill xmlns:a14="http://schemas.microsoft.com/office/drawing/2010/main">
-                <a:solidFill>
-                  <a:schemeClr val="accent1"/>
-                </a:solidFill>
-              </a14:hiddenFill>
-            </a:ext>
-            <a:ext uri="{91240B29-F687-4F45-9708-019B960494DF}">
-              <a14:hiddenLine xmlns:a14="http://schemas.microsoft.com/office/drawing/2010/main" w="9525">
-                <a:solidFill>
-                  <a:schemeClr val="tx1"/>
-                </a:solidFill>
-                <a:miter lim="800000"/>
-                <a:headEnd/>
-                <a:tailEnd/>
-              </a14:hiddenLine>
-            </a:ext>
-          </a:extLst>
-        </p:spPr>
-      </p:pic>
-    </p:spTree>
-    <p:extLst>
-      <p:ext uri="{BB962C8B-B14F-4D97-AF65-F5344CB8AC3E}">
-        <p14:creationId xmlns:p14="http://schemas.microsoft.com/office/powerpoint/2010/main" val="4277121361"/>
-      </p:ext>
-    </p:extLst>
-  </p:cSld>
-  <p:clrMapOvr>
-    <a:masterClrMapping/>
-  </p:clrMapOvr>
-  <p:timing>
-    <p:tnLst>
-      <p:par>
-        <p:cTn id="1" dur="indefinite" restart="never" nodeType="tmRoot"/>
-      </p:par>
-    </p:tnLst>
-  </p:timing>
-</p:sld>
-</file>
-
-<file path=ppt/slides/slide12.xml><?xml version="1.0" encoding="utf-8"?>
-<p:sld xmlns:a="http://schemas.openxmlformats.org/drawingml/2006/main" xmlns:r="http://schemas.openxmlformats.org/officeDocument/2006/relationships" xmlns:p="http://schemas.openxmlformats.org/presentationml/2006/main">
-  <p:cSld>
-    <p:spTree>
-      <p:nvGrpSpPr>
-        <p:cNvPr id="1" name=""/>
-        <p:cNvGrpSpPr/>
-        <p:nvPr/>
-      </p:nvGrpSpPr>
-      <p:grpSpPr>
-        <a:xfrm>
-          <a:off x="0" y="0"/>
-          <a:ext cx="0" cy="0"/>
-          <a:chOff x="0" y="0"/>
-          <a:chExt cx="0" cy="0"/>
-        </a:xfrm>
-      </p:grpSpPr>
-      <p:pic>
-        <p:nvPicPr>
           <p:cNvPr id="6146" name="Picture 2"/>
           <p:cNvPicPr>
             <a:picLocks noChangeAspect="1" noChangeArrowheads="1"/>
@@ -3569,7 +3293,73 @@
 </p:sld>
 </file>
 
-<file path=ppt/slides/slide2.xml><?xml version="1.0" encoding="utf-8"?>
+<file path=ppt/slides/slide11.xml><?xml version="1.0" encoding="utf-8"?>
+<p:sld xmlns:a="http://schemas.openxmlformats.org/drawingml/2006/main" xmlns:r="http://schemas.openxmlformats.org/officeDocument/2006/relationships" xmlns:p="http://schemas.openxmlformats.org/presentationml/2006/main">
+  <p:cSld>
+    <p:spTree>
+      <p:nvGrpSpPr>
+        <p:cNvPr id="1" name=""/>
+        <p:cNvGrpSpPr/>
+        <p:nvPr/>
+      </p:nvGrpSpPr>
+      <p:grpSpPr>
+        <a:xfrm>
+          <a:off x="0" y="0"/>
+          <a:ext cx="0" cy="0"/>
+          <a:chOff x="0" y="0"/>
+          <a:chExt cx="0" cy="0"/>
+        </a:xfrm>
+      </p:grpSpPr>
+      <p:sp>
+        <p:nvSpPr>
+          <p:cNvPr id="2" name="1 Título"/>
+          <p:cNvSpPr>
+            <a:spLocks noGrp="1"/>
+          </p:cNvSpPr>
+          <p:nvPr>
+            <p:ph type="title"/>
+          </p:nvPr>
+        </p:nvSpPr>
+        <p:spPr>
+          <a:xfrm>
+            <a:off x="457200" y="2862064"/>
+            <a:ext cx="8229600" cy="1143000"/>
+          </a:xfrm>
+        </p:spPr>
+        <p:txBody>
+          <a:bodyPr/>
+          <a:lstStyle/>
+          <a:p>
+            <a:r>
+              <a:rPr lang="en-US" dirty="0" smtClean="0"/>
+              <a:t>Maybe </a:t>
+            </a:r>
+            <a:r>
+              <a:rPr lang="en-US" dirty="0" err="1" smtClean="0"/>
+              <a:t>supp</a:t>
+            </a:r>
+            <a:r>
+              <a:rPr lang="en-US" dirty="0" smtClean="0"/>
+              <a:t> material??</a:t>
+            </a:r>
+            <a:endParaRPr lang="en-US" dirty="0"/>
+          </a:p>
+        </p:txBody>
+      </p:sp>
+    </p:spTree>
+    <p:extLst>
+      <p:ext uri="{BB962C8B-B14F-4D97-AF65-F5344CB8AC3E}">
+        <p14:creationId xmlns:p14="http://schemas.microsoft.com/office/powerpoint/2010/main" val="3764072575"/>
+      </p:ext>
+    </p:extLst>
+  </p:cSld>
+  <p:clrMapOvr>
+    <a:masterClrMapping/>
+  </p:clrMapOvr>
+</p:sld>
+</file>
+
+<file path=ppt/slides/slide12.xml><?xml version="1.0" encoding="utf-8"?>
 <p:sld xmlns:a="http://schemas.openxmlformats.org/drawingml/2006/main" xmlns:r="http://schemas.openxmlformats.org/officeDocument/2006/relationships" xmlns:p="http://schemas.openxmlformats.org/presentationml/2006/main">
   <p:cSld>
     <p:spTree>
@@ -28120,7 +27910,7 @@
 </p:sld>
 </file>
 
-<file path=ppt/slides/slide3.xml><?xml version="1.0" encoding="utf-8"?>
+<file path=ppt/slides/slide2.xml><?xml version="1.0" encoding="utf-8"?>
 <p:sld xmlns:a="http://schemas.openxmlformats.org/drawingml/2006/main" xmlns:r="http://schemas.openxmlformats.org/officeDocument/2006/relationships" xmlns:p="http://schemas.openxmlformats.org/presentationml/2006/main">
   <p:cSld>
     <p:spTree>
@@ -28154,7 +27944,11 @@
           <a:p>
             <a:r>
               <a:rPr lang="en-US" dirty="0" smtClean="0"/>
-              <a:t>Figure X2a</a:t>
+              <a:t>Figure </a:t>
+            </a:r>
+            <a:r>
+              <a:rPr lang="en-US" dirty="0" smtClean="0"/>
+              <a:t>3a</a:t>
             </a:r>
             <a:endParaRPr lang="en-US" dirty="0"/>
           </a:p>
@@ -28162,7 +27956,7 @@
       </p:sp>
       <p:pic>
         <p:nvPicPr>
-          <p:cNvPr id="2050" name="Picture 2"/>
+          <p:cNvPr id="1027" name="Picture 3"/>
           <p:cNvPicPr>
             <a:picLocks noChangeAspect="1" noChangeArrowheads="1"/>
           </p:cNvPicPr>
@@ -28183,8 +27977,8 @@
         </p:blipFill>
         <p:spPr bwMode="auto">
           <a:xfrm>
-            <a:off x="1716402" y="1470929"/>
-            <a:ext cx="5705475" cy="5372100"/>
+            <a:off x="1576388" y="1443186"/>
+            <a:ext cx="5991225" cy="5010150"/>
           </a:xfrm>
           <a:prstGeom prst="rect">
             <a:avLst/>
@@ -28193,7 +27987,6 @@
           <a:ln>
             <a:noFill/>
           </a:ln>
-          <a:effectLst/>
           <a:extLst>
             <a:ext uri="{909E8E84-426E-40DD-AFC4-6F175D3DCCD1}">
               <a14:hiddenFill xmlns:a14="http://schemas.microsoft.com/office/drawing/2010/main">
@@ -28211,15 +28004,6 @@
                 <a:headEnd/>
                 <a:tailEnd/>
               </a14:hiddenLine>
-            </a:ext>
-            <a:ext uri="{AF507438-7753-43E0-B8FC-AC1667EBCBE1}">
-              <a14:hiddenEffects xmlns:a14="http://schemas.microsoft.com/office/drawing/2010/main">
-                <a:effectLst>
-                  <a:outerShdw dist="35921" dir="2700000" algn="ctr" rotWithShape="0">
-                    <a:schemeClr val="bg2"/>
-                  </a:outerShdw>
-                </a:effectLst>
-              </a14:hiddenEffects>
             </a:ext>
           </a:extLst>
         </p:spPr>
@@ -28244,139 +28028,7 @@
 </p:sld>
 </file>
 
-<file path=ppt/slides/slide4.xml><?xml version="1.0" encoding="utf-8"?>
-<p:sld xmlns:a="http://schemas.openxmlformats.org/drawingml/2006/main" xmlns:r="http://schemas.openxmlformats.org/officeDocument/2006/relationships" xmlns:p="http://schemas.openxmlformats.org/presentationml/2006/main">
-  <p:cSld>
-    <p:spTree>
-      <p:nvGrpSpPr>
-        <p:cNvPr id="1" name=""/>
-        <p:cNvGrpSpPr/>
-        <p:nvPr/>
-      </p:nvGrpSpPr>
-      <p:grpSpPr>
-        <a:xfrm>
-          <a:off x="0" y="0"/>
-          <a:ext cx="0" cy="0"/>
-          <a:chOff x="0" y="0"/>
-          <a:chExt cx="0" cy="0"/>
-        </a:xfrm>
-      </p:grpSpPr>
-      <p:pic>
-        <p:nvPicPr>
-          <p:cNvPr id="43010" name="Picture 2"/>
-          <p:cNvPicPr>
-            <a:picLocks noChangeAspect="1" noChangeArrowheads="1"/>
-          </p:cNvPicPr>
-          <p:nvPr/>
-        </p:nvPicPr>
-        <p:blipFill>
-          <a:blip r:embed="rId2">
-            <a:extLst>
-              <a:ext uri="{28A0092B-C50C-407E-A947-70E740481C1C}">
-                <a14:useLocalDpi xmlns:a14="http://schemas.microsoft.com/office/drawing/2010/main" val="0"/>
-              </a:ext>
-            </a:extLst>
-          </a:blip>
-          <a:srcRect/>
-          <a:stretch>
-            <a:fillRect/>
-          </a:stretch>
-        </p:blipFill>
-        <p:spPr bwMode="auto">
-          <a:xfrm>
-            <a:off x="1733550" y="995363"/>
-            <a:ext cx="5676900" cy="4867275"/>
-          </a:xfrm>
-          <a:prstGeom prst="rect">
-            <a:avLst/>
-          </a:prstGeom>
-          <a:noFill/>
-          <a:ln>
-            <a:noFill/>
-          </a:ln>
-          <a:effectLst/>
-          <a:extLst>
-            <a:ext uri="{909E8E84-426E-40DD-AFC4-6F175D3DCCD1}">
-              <a14:hiddenFill xmlns:a14="http://schemas.microsoft.com/office/drawing/2010/main">
-                <a:solidFill>
-                  <a:schemeClr val="accent1"/>
-                </a:solidFill>
-              </a14:hiddenFill>
-            </a:ext>
-            <a:ext uri="{91240B29-F687-4F45-9708-019B960494DF}">
-              <a14:hiddenLine xmlns:a14="http://schemas.microsoft.com/office/drawing/2010/main" w="9525">
-                <a:solidFill>
-                  <a:schemeClr val="tx1"/>
-                </a:solidFill>
-                <a:miter lim="800000"/>
-                <a:headEnd/>
-                <a:tailEnd/>
-              </a14:hiddenLine>
-            </a:ext>
-            <a:ext uri="{AF507438-7753-43E0-B8FC-AC1667EBCBE1}">
-              <a14:hiddenEffects xmlns:a14="http://schemas.microsoft.com/office/drawing/2010/main">
-                <a:effectLst>
-                  <a:outerShdw dist="35921" dir="2700000" algn="ctr" rotWithShape="0">
-                    <a:schemeClr val="bg2"/>
-                  </a:outerShdw>
-                </a:effectLst>
-              </a14:hiddenEffects>
-            </a:ext>
-          </a:extLst>
-        </p:spPr>
-      </p:pic>
-      <p:sp>
-        <p:nvSpPr>
-          <p:cNvPr id="3" name="2 CuadroTexto"/>
-          <p:cNvSpPr txBox="1"/>
-          <p:nvPr/>
-        </p:nvSpPr>
-        <p:spPr>
-          <a:xfrm>
-            <a:off x="2915816" y="116632"/>
-            <a:ext cx="4968552" cy="707886"/>
-          </a:xfrm>
-          <a:prstGeom prst="rect">
-            <a:avLst/>
-          </a:prstGeom>
-          <a:noFill/>
-        </p:spPr>
-        <p:txBody>
-          <a:bodyPr wrap="square" rtlCol="0">
-            <a:spAutoFit/>
-          </a:bodyPr>
-          <a:lstStyle/>
-          <a:p>
-            <a:r>
-              <a:rPr lang="en-US" sz="4000" b="1" dirty="0" smtClean="0">
-                <a:solidFill>
-                  <a:srgbClr val="FF0000"/>
-                </a:solidFill>
-              </a:rPr>
-              <a:t>New Version!</a:t>
-            </a:r>
-            <a:endParaRPr lang="en-US" sz="4000" b="1" dirty="0">
-              <a:solidFill>
-                <a:srgbClr val="FF0000"/>
-              </a:solidFill>
-            </a:endParaRPr>
-          </a:p>
-        </p:txBody>
-      </p:sp>
-    </p:spTree>
-    <p:extLst>
-      <p:ext uri="{BB962C8B-B14F-4D97-AF65-F5344CB8AC3E}">
-        <p14:creationId xmlns:p14="http://schemas.microsoft.com/office/powerpoint/2010/main" val="3828469362"/>
-      </p:ext>
-    </p:extLst>
-  </p:cSld>
-  <p:clrMapOvr>
-    <a:masterClrMapping/>
-  </p:clrMapOvr>
-</p:sld>
-</file>
-
-<file path=ppt/slides/slide5.xml><?xml version="1.0" encoding="utf-8"?>
+<file path=ppt/slides/slide3.xml><?xml version="1.0" encoding="utf-8"?>
 <p:sld xmlns:a="http://schemas.openxmlformats.org/drawingml/2006/main" xmlns:r="http://schemas.openxmlformats.org/officeDocument/2006/relationships" xmlns:p="http://schemas.openxmlformats.org/presentationml/2006/main">
   <p:cSld>
     <p:spTree>
@@ -28490,10 +28142,17 @@
   <p:clrMapOvr>
     <a:masterClrMapping/>
   </p:clrMapOvr>
+  <p:timing>
+    <p:tnLst>
+      <p:par>
+        <p:cTn id="1" dur="indefinite" restart="never" nodeType="tmRoot"/>
+      </p:par>
+    </p:tnLst>
+  </p:timing>
 </p:sld>
 </file>
 
-<file path=ppt/slides/slide6.xml><?xml version="1.0" encoding="utf-8"?>
+<file path=ppt/slides/slide4.xml><?xml version="1.0" encoding="utf-8"?>
 <p:sld xmlns:a="http://schemas.openxmlformats.org/drawingml/2006/main" xmlns:r="http://schemas.openxmlformats.org/officeDocument/2006/relationships" xmlns:p="http://schemas.openxmlformats.org/presentationml/2006/main">
   <p:cSld>
     <p:spTree>
@@ -28632,7 +28291,7 @@
 </p:sld>
 </file>
 
-<file path=ppt/slides/slide7.xml><?xml version="1.0" encoding="utf-8"?>
+<file path=ppt/slides/slide5.xml><?xml version="1.0" encoding="utf-8"?>
 <p:sld xmlns:a="http://schemas.openxmlformats.org/drawingml/2006/main" xmlns:r="http://schemas.openxmlformats.org/officeDocument/2006/relationships" xmlns:p="http://schemas.openxmlformats.org/presentationml/2006/main">
   <p:cSld>
     <p:spTree>
@@ -28982,7 +28641,7 @@
 </p:sld>
 </file>
 
-<file path=ppt/slides/slide8.xml><?xml version="1.0" encoding="utf-8"?>
+<file path=ppt/slides/slide6.xml><?xml version="1.0" encoding="utf-8"?>
 <p:sld xmlns:a="http://schemas.openxmlformats.org/drawingml/2006/main" xmlns:r="http://schemas.openxmlformats.org/officeDocument/2006/relationships" xmlns:p="http://schemas.openxmlformats.org/presentationml/2006/main">
   <p:cSld>
     <p:spTree>
@@ -29332,7 +28991,7 @@
 </p:sld>
 </file>
 
-<file path=ppt/slides/slide9.xml><?xml version="1.0" encoding="utf-8"?>
+<file path=ppt/slides/slide7.xml><?xml version="1.0" encoding="utf-8"?>
 <p:sld xmlns:a="http://schemas.openxmlformats.org/drawingml/2006/main" xmlns:r="http://schemas.openxmlformats.org/officeDocument/2006/relationships" xmlns:p="http://schemas.openxmlformats.org/presentationml/2006/main">
   <p:cSld>
     <p:spTree>
@@ -29447,6 +29106,282 @@
     <p:extLst>
       <p:ext uri="{BB962C8B-B14F-4D97-AF65-F5344CB8AC3E}">
         <p14:creationId xmlns:p14="http://schemas.microsoft.com/office/powerpoint/2010/main" val="536557031"/>
+      </p:ext>
+    </p:extLst>
+  </p:cSld>
+  <p:clrMapOvr>
+    <a:masterClrMapping/>
+  </p:clrMapOvr>
+  <p:timing>
+    <p:tnLst>
+      <p:par>
+        <p:cTn id="1" dur="indefinite" restart="never" nodeType="tmRoot"/>
+      </p:par>
+    </p:tnLst>
+  </p:timing>
+</p:sld>
+</file>
+
+<file path=ppt/slides/slide8.xml><?xml version="1.0" encoding="utf-8"?>
+<p:sld xmlns:a="http://schemas.openxmlformats.org/drawingml/2006/main" xmlns:r="http://schemas.openxmlformats.org/officeDocument/2006/relationships" xmlns:p="http://schemas.openxmlformats.org/presentationml/2006/main">
+  <p:cSld>
+    <p:spTree>
+      <p:nvGrpSpPr>
+        <p:cNvPr id="1" name=""/>
+        <p:cNvGrpSpPr/>
+        <p:nvPr/>
+      </p:nvGrpSpPr>
+      <p:grpSpPr>
+        <a:xfrm>
+          <a:off x="0" y="0"/>
+          <a:ext cx="0" cy="0"/>
+          <a:chOff x="0" y="0"/>
+          <a:chExt cx="0" cy="0"/>
+        </a:xfrm>
+      </p:grpSpPr>
+      <p:pic>
+        <p:nvPicPr>
+          <p:cNvPr id="3074" name="Picture 2"/>
+          <p:cNvPicPr>
+            <a:picLocks noChangeAspect="1" noChangeArrowheads="1"/>
+          </p:cNvPicPr>
+          <p:nvPr/>
+        </p:nvPicPr>
+        <p:blipFill>
+          <a:blip r:embed="rId2">
+            <a:extLst>
+              <a:ext uri="{28A0092B-C50C-407E-A947-70E740481C1C}">
+                <a14:useLocalDpi xmlns:a14="http://schemas.microsoft.com/office/drawing/2010/main" val="0"/>
+              </a:ext>
+            </a:extLst>
+          </a:blip>
+          <a:srcRect/>
+          <a:stretch>
+            <a:fillRect/>
+          </a:stretch>
+        </p:blipFill>
+        <p:spPr bwMode="auto">
+          <a:xfrm>
+            <a:off x="1676400" y="2328863"/>
+            <a:ext cx="5791200" cy="2200275"/>
+          </a:xfrm>
+          <a:prstGeom prst="rect">
+            <a:avLst/>
+          </a:prstGeom>
+          <a:noFill/>
+          <a:ln>
+            <a:noFill/>
+          </a:ln>
+          <a:extLst>
+            <a:ext uri="{909E8E84-426E-40DD-AFC4-6F175D3DCCD1}">
+              <a14:hiddenFill xmlns:a14="http://schemas.microsoft.com/office/drawing/2010/main">
+                <a:solidFill>
+                  <a:schemeClr val="accent1"/>
+                </a:solidFill>
+              </a14:hiddenFill>
+            </a:ext>
+            <a:ext uri="{91240B29-F687-4F45-9708-019B960494DF}">
+              <a14:hiddenLine xmlns:a14="http://schemas.microsoft.com/office/drawing/2010/main" w="9525">
+                <a:solidFill>
+                  <a:schemeClr val="tx1"/>
+                </a:solidFill>
+                <a:miter lim="800000"/>
+                <a:headEnd/>
+                <a:tailEnd/>
+              </a14:hiddenLine>
+            </a:ext>
+          </a:extLst>
+        </p:spPr>
+      </p:pic>
+    </p:spTree>
+    <p:extLst>
+      <p:ext uri="{BB962C8B-B14F-4D97-AF65-F5344CB8AC3E}">
+        <p14:creationId xmlns:p14="http://schemas.microsoft.com/office/powerpoint/2010/main" val="1767875964"/>
+      </p:ext>
+    </p:extLst>
+  </p:cSld>
+  <p:clrMapOvr>
+    <a:masterClrMapping/>
+  </p:clrMapOvr>
+  <p:timing>
+    <p:tnLst>
+      <p:par>
+        <p:cTn id="1" dur="indefinite" restart="never" nodeType="tmRoot"/>
+      </p:par>
+    </p:tnLst>
+  </p:timing>
+</p:sld>
+</file>
+
+<file path=ppt/slides/slide9.xml><?xml version="1.0" encoding="utf-8"?>
+<p:sld xmlns:a="http://schemas.openxmlformats.org/drawingml/2006/main" xmlns:r="http://schemas.openxmlformats.org/officeDocument/2006/relationships" xmlns:p="http://schemas.openxmlformats.org/presentationml/2006/main">
+  <p:cSld>
+    <p:spTree>
+      <p:nvGrpSpPr>
+        <p:cNvPr id="1" name=""/>
+        <p:cNvGrpSpPr/>
+        <p:nvPr/>
+      </p:nvGrpSpPr>
+      <p:grpSpPr>
+        <a:xfrm>
+          <a:off x="0" y="0"/>
+          <a:ext cx="0" cy="0"/>
+          <a:chOff x="0" y="0"/>
+          <a:chExt cx="0" cy="0"/>
+        </a:xfrm>
+      </p:grpSpPr>
+      <p:pic>
+        <p:nvPicPr>
+          <p:cNvPr id="5122" name="Picture 2"/>
+          <p:cNvPicPr>
+            <a:picLocks noChangeAspect="1" noChangeArrowheads="1"/>
+          </p:cNvPicPr>
+          <p:nvPr/>
+        </p:nvPicPr>
+        <p:blipFill>
+          <a:blip r:embed="rId2">
+            <a:extLst>
+              <a:ext uri="{28A0092B-C50C-407E-A947-70E740481C1C}">
+                <a14:useLocalDpi xmlns:a14="http://schemas.microsoft.com/office/drawing/2010/main" val="0"/>
+              </a:ext>
+            </a:extLst>
+          </a:blip>
+          <a:srcRect/>
+          <a:stretch>
+            <a:fillRect/>
+          </a:stretch>
+        </p:blipFill>
+        <p:spPr bwMode="auto">
+          <a:xfrm>
+            <a:off x="1566863" y="1217613"/>
+            <a:ext cx="6010275" cy="4429125"/>
+          </a:xfrm>
+          <a:prstGeom prst="rect">
+            <a:avLst/>
+          </a:prstGeom>
+          <a:noFill/>
+          <a:ln>
+            <a:noFill/>
+          </a:ln>
+          <a:effectLst/>
+          <a:extLst>
+            <a:ext uri="{909E8E84-426E-40DD-AFC4-6F175D3DCCD1}">
+              <a14:hiddenFill xmlns:a14="http://schemas.microsoft.com/office/drawing/2010/main">
+                <a:solidFill>
+                  <a:schemeClr val="accent1"/>
+                </a:solidFill>
+              </a14:hiddenFill>
+            </a:ext>
+            <a:ext uri="{91240B29-F687-4F45-9708-019B960494DF}">
+              <a14:hiddenLine xmlns:a14="http://schemas.microsoft.com/office/drawing/2010/main" w="9525">
+                <a:solidFill>
+                  <a:schemeClr val="tx1"/>
+                </a:solidFill>
+                <a:miter lim="800000"/>
+                <a:headEnd/>
+                <a:tailEnd/>
+              </a14:hiddenLine>
+            </a:ext>
+            <a:ext uri="{AF507438-7753-43E0-B8FC-AC1667EBCBE1}">
+              <a14:hiddenEffects xmlns:a14="http://schemas.microsoft.com/office/drawing/2010/main">
+                <a:effectLst>
+                  <a:outerShdw dist="35921" dir="2700000" algn="ctr" rotWithShape="0">
+                    <a:schemeClr val="bg2"/>
+                  </a:outerShdw>
+                </a:effectLst>
+              </a14:hiddenEffects>
+            </a:ext>
+          </a:extLst>
+        </p:spPr>
+      </p:pic>
+      <p:sp>
+        <p:nvSpPr>
+          <p:cNvPr id="2" name="1 CuadroTexto"/>
+          <p:cNvSpPr txBox="1"/>
+          <p:nvPr/>
+        </p:nvSpPr>
+        <p:spPr>
+          <a:xfrm>
+            <a:off x="2483768" y="404664"/>
+            <a:ext cx="3672408" cy="369332"/>
+          </a:xfrm>
+          <a:prstGeom prst="rect">
+            <a:avLst/>
+          </a:prstGeom>
+          <a:noFill/>
+        </p:spPr>
+        <p:txBody>
+          <a:bodyPr wrap="square" rtlCol="0">
+            <a:spAutoFit/>
+          </a:bodyPr>
+          <a:lstStyle/>
+          <a:p>
+            <a:r>
+              <a:rPr lang="en-US" dirty="0" smtClean="0"/>
+              <a:t>Theta two, n=2</a:t>
+            </a:r>
+            <a:endParaRPr lang="en-US" dirty="0"/>
+          </a:p>
+        </p:txBody>
+      </p:sp>
+      <p:pic>
+        <p:nvPicPr>
+          <p:cNvPr id="5123" name="Picture 3"/>
+          <p:cNvPicPr>
+            <a:picLocks noChangeAspect="1" noChangeArrowheads="1"/>
+          </p:cNvPicPr>
+          <p:nvPr/>
+        </p:nvPicPr>
+        <p:blipFill>
+          <a:blip r:embed="rId3">
+            <a:extLst>
+              <a:ext uri="{28A0092B-C50C-407E-A947-70E740481C1C}">
+                <a14:useLocalDpi xmlns:a14="http://schemas.microsoft.com/office/drawing/2010/main" val="0"/>
+              </a:ext>
+            </a:extLst>
+          </a:blip>
+          <a:srcRect/>
+          <a:stretch>
+            <a:fillRect/>
+          </a:stretch>
+        </p:blipFill>
+        <p:spPr bwMode="auto">
+          <a:xfrm>
+            <a:off x="1719263" y="1366838"/>
+            <a:ext cx="6010275" cy="4429125"/>
+          </a:xfrm>
+          <a:prstGeom prst="rect">
+            <a:avLst/>
+          </a:prstGeom>
+          <a:noFill/>
+          <a:ln>
+            <a:noFill/>
+          </a:ln>
+          <a:extLst>
+            <a:ext uri="{909E8E84-426E-40DD-AFC4-6F175D3DCCD1}">
+              <a14:hiddenFill xmlns:a14="http://schemas.microsoft.com/office/drawing/2010/main">
+                <a:solidFill>
+                  <a:schemeClr val="accent1"/>
+                </a:solidFill>
+              </a14:hiddenFill>
+            </a:ext>
+            <a:ext uri="{91240B29-F687-4F45-9708-019B960494DF}">
+              <a14:hiddenLine xmlns:a14="http://schemas.microsoft.com/office/drawing/2010/main" w="9525">
+                <a:solidFill>
+                  <a:schemeClr val="tx1"/>
+                </a:solidFill>
+                <a:miter lim="800000"/>
+                <a:headEnd/>
+                <a:tailEnd/>
+              </a14:hiddenLine>
+            </a:ext>
+          </a:extLst>
+        </p:spPr>
+      </p:pic>
+    </p:spTree>
+    <p:extLst>
+      <p:ext uri="{BB962C8B-B14F-4D97-AF65-F5344CB8AC3E}">
+        <p14:creationId xmlns:p14="http://schemas.microsoft.com/office/powerpoint/2010/main" val="4277121361"/>
       </p:ext>
     </p:extLst>
   </p:cSld>

</xml_diff>

<commit_message>
working in Ewens plot
The plot looks weird, so it may be something related to the merge, plots
of Ewens vs simulations look fine.
</commit_message>
<xml_diff>
--- a/Figures draft for manuscript.pptx
+++ b/Figures draft for manuscript.pptx
@@ -6,17 +6,19 @@
   </p:sldMasterIdLst>
   <p:sldIdLst>
     <p:sldId id="256" r:id="rId2"/>
-    <p:sldId id="258" r:id="rId3"/>
-    <p:sldId id="259" r:id="rId4"/>
-    <p:sldId id="260" r:id="rId5"/>
-    <p:sldId id="262" r:id="rId6"/>
-    <p:sldId id="263" r:id="rId7"/>
-    <p:sldId id="264" r:id="rId8"/>
-    <p:sldId id="265" r:id="rId9"/>
-    <p:sldId id="266" r:id="rId10"/>
-    <p:sldId id="267" r:id="rId11"/>
-    <p:sldId id="268" r:id="rId12"/>
-    <p:sldId id="257" r:id="rId13"/>
+    <p:sldId id="270" r:id="rId3"/>
+    <p:sldId id="269" r:id="rId4"/>
+    <p:sldId id="258" r:id="rId5"/>
+    <p:sldId id="259" r:id="rId6"/>
+    <p:sldId id="260" r:id="rId7"/>
+    <p:sldId id="262" r:id="rId8"/>
+    <p:sldId id="263" r:id="rId9"/>
+    <p:sldId id="264" r:id="rId10"/>
+    <p:sldId id="265" r:id="rId11"/>
+    <p:sldId id="266" r:id="rId12"/>
+    <p:sldId id="267" r:id="rId13"/>
+    <p:sldId id="268" r:id="rId14"/>
+    <p:sldId id="257" r:id="rId15"/>
   </p:sldIdLst>
   <p:sldSz cx="9144000" cy="6858000" type="screen4x3"/>
   <p:notesSz cx="6858000" cy="9144000"/>
@@ -299,7 +301,7 @@
           <a:p>
             <a:fld id="{C2957447-5BFD-4CE2-A5BA-15C06B9C0B91}" type="datetimeFigureOut">
               <a:rPr lang="en-US" smtClean="0"/>
-              <a:t>8/12/2015</a:t>
+              <a:t>8/25/2015</a:t>
             </a:fld>
             <a:endParaRPr lang="en-US"/>
           </a:p>
@@ -469,7 +471,7 @@
           <a:p>
             <a:fld id="{C2957447-5BFD-4CE2-A5BA-15C06B9C0B91}" type="datetimeFigureOut">
               <a:rPr lang="en-US" smtClean="0"/>
-              <a:t>8/12/2015</a:t>
+              <a:t>8/25/2015</a:t>
             </a:fld>
             <a:endParaRPr lang="en-US"/>
           </a:p>
@@ -649,7 +651,7 @@
           <a:p>
             <a:fld id="{C2957447-5BFD-4CE2-A5BA-15C06B9C0B91}" type="datetimeFigureOut">
               <a:rPr lang="en-US" smtClean="0"/>
-              <a:t>8/12/2015</a:t>
+              <a:t>8/25/2015</a:t>
             </a:fld>
             <a:endParaRPr lang="en-US"/>
           </a:p>
@@ -819,7 +821,7 @@
           <a:p>
             <a:fld id="{C2957447-5BFD-4CE2-A5BA-15C06B9C0B91}" type="datetimeFigureOut">
               <a:rPr lang="en-US" smtClean="0"/>
-              <a:t>8/12/2015</a:t>
+              <a:t>8/25/2015</a:t>
             </a:fld>
             <a:endParaRPr lang="en-US"/>
           </a:p>
@@ -1065,7 +1067,7 @@
           <a:p>
             <a:fld id="{C2957447-5BFD-4CE2-A5BA-15C06B9C0B91}" type="datetimeFigureOut">
               <a:rPr lang="en-US" smtClean="0"/>
-              <a:t>8/12/2015</a:t>
+              <a:t>8/25/2015</a:t>
             </a:fld>
             <a:endParaRPr lang="en-US"/>
           </a:p>
@@ -1353,7 +1355,7 @@
           <a:p>
             <a:fld id="{C2957447-5BFD-4CE2-A5BA-15C06B9C0B91}" type="datetimeFigureOut">
               <a:rPr lang="en-US" smtClean="0"/>
-              <a:t>8/12/2015</a:t>
+              <a:t>8/25/2015</a:t>
             </a:fld>
             <a:endParaRPr lang="en-US"/>
           </a:p>
@@ -1775,7 +1777,7 @@
           <a:p>
             <a:fld id="{C2957447-5BFD-4CE2-A5BA-15C06B9C0B91}" type="datetimeFigureOut">
               <a:rPr lang="en-US" smtClean="0"/>
-              <a:t>8/12/2015</a:t>
+              <a:t>8/25/2015</a:t>
             </a:fld>
             <a:endParaRPr lang="en-US"/>
           </a:p>
@@ -1893,7 +1895,7 @@
           <a:p>
             <a:fld id="{C2957447-5BFD-4CE2-A5BA-15C06B9C0B91}" type="datetimeFigureOut">
               <a:rPr lang="en-US" smtClean="0"/>
-              <a:t>8/12/2015</a:t>
+              <a:t>8/25/2015</a:t>
             </a:fld>
             <a:endParaRPr lang="en-US"/>
           </a:p>
@@ -1988,7 +1990,7 @@
           <a:p>
             <a:fld id="{C2957447-5BFD-4CE2-A5BA-15C06B9C0B91}" type="datetimeFigureOut">
               <a:rPr lang="en-US" smtClean="0"/>
-              <a:t>8/12/2015</a:t>
+              <a:t>8/25/2015</a:t>
             </a:fld>
             <a:endParaRPr lang="en-US"/>
           </a:p>
@@ -2265,7 +2267,7 @@
           <a:p>
             <a:fld id="{C2957447-5BFD-4CE2-A5BA-15C06B9C0B91}" type="datetimeFigureOut">
               <a:rPr lang="en-US" smtClean="0"/>
-              <a:t>8/12/2015</a:t>
+              <a:t>8/25/2015</a:t>
             </a:fld>
             <a:endParaRPr lang="en-US"/>
           </a:p>
@@ -2518,7 +2520,7 @@
           <a:p>
             <a:fld id="{C2957447-5BFD-4CE2-A5BA-15C06B9C0B91}" type="datetimeFigureOut">
               <a:rPr lang="en-US" smtClean="0"/>
-              <a:t>8/12/2015</a:t>
+              <a:t>8/25/2015</a:t>
             </a:fld>
             <a:endParaRPr lang="en-US"/>
           </a:p>
@@ -2731,7 +2733,7 @@
           <a:p>
             <a:fld id="{C2957447-5BFD-4CE2-A5BA-15C06B9C0B91}" type="datetimeFigureOut">
               <a:rPr lang="en-US" smtClean="0"/>
-              <a:t>8/12/2015</a:t>
+              <a:t>8/25/2015</a:t>
             </a:fld>
             <a:endParaRPr lang="en-US"/>
           </a:p>
@@ -3191,6 +3193,282 @@
       </p:grpSpPr>
       <p:pic>
         <p:nvPicPr>
+          <p:cNvPr id="3074" name="Picture 2"/>
+          <p:cNvPicPr>
+            <a:picLocks noChangeAspect="1" noChangeArrowheads="1"/>
+          </p:cNvPicPr>
+          <p:nvPr/>
+        </p:nvPicPr>
+        <p:blipFill>
+          <a:blip r:embed="rId2">
+            <a:extLst>
+              <a:ext uri="{28A0092B-C50C-407E-A947-70E740481C1C}">
+                <a14:useLocalDpi xmlns:a14="http://schemas.microsoft.com/office/drawing/2010/main" val="0"/>
+              </a:ext>
+            </a:extLst>
+          </a:blip>
+          <a:srcRect/>
+          <a:stretch>
+            <a:fillRect/>
+          </a:stretch>
+        </p:blipFill>
+        <p:spPr bwMode="auto">
+          <a:xfrm>
+            <a:off x="1676400" y="2328863"/>
+            <a:ext cx="5791200" cy="2200275"/>
+          </a:xfrm>
+          <a:prstGeom prst="rect">
+            <a:avLst/>
+          </a:prstGeom>
+          <a:noFill/>
+          <a:ln>
+            <a:noFill/>
+          </a:ln>
+          <a:extLst>
+            <a:ext uri="{909E8E84-426E-40DD-AFC4-6F175D3DCCD1}">
+              <a14:hiddenFill xmlns:a14="http://schemas.microsoft.com/office/drawing/2010/main">
+                <a:solidFill>
+                  <a:schemeClr val="accent1"/>
+                </a:solidFill>
+              </a14:hiddenFill>
+            </a:ext>
+            <a:ext uri="{91240B29-F687-4F45-9708-019B960494DF}">
+              <a14:hiddenLine xmlns:a14="http://schemas.microsoft.com/office/drawing/2010/main" w="9525">
+                <a:solidFill>
+                  <a:schemeClr val="tx1"/>
+                </a:solidFill>
+                <a:miter lim="800000"/>
+                <a:headEnd/>
+                <a:tailEnd/>
+              </a14:hiddenLine>
+            </a:ext>
+          </a:extLst>
+        </p:spPr>
+      </p:pic>
+    </p:spTree>
+    <p:extLst>
+      <p:ext uri="{BB962C8B-B14F-4D97-AF65-F5344CB8AC3E}">
+        <p14:creationId xmlns:p14="http://schemas.microsoft.com/office/powerpoint/2010/main" val="1767875964"/>
+      </p:ext>
+    </p:extLst>
+  </p:cSld>
+  <p:clrMapOvr>
+    <a:masterClrMapping/>
+  </p:clrMapOvr>
+  <p:timing>
+    <p:tnLst>
+      <p:par>
+        <p:cTn id="1" dur="indefinite" restart="never" nodeType="tmRoot"/>
+      </p:par>
+    </p:tnLst>
+  </p:timing>
+</p:sld>
+</file>
+
+<file path=ppt/slides/slide11.xml><?xml version="1.0" encoding="utf-8"?>
+<p:sld xmlns:a="http://schemas.openxmlformats.org/drawingml/2006/main" xmlns:r="http://schemas.openxmlformats.org/officeDocument/2006/relationships" xmlns:p="http://schemas.openxmlformats.org/presentationml/2006/main">
+  <p:cSld>
+    <p:spTree>
+      <p:nvGrpSpPr>
+        <p:cNvPr id="1" name=""/>
+        <p:cNvGrpSpPr/>
+        <p:nvPr/>
+      </p:nvGrpSpPr>
+      <p:grpSpPr>
+        <a:xfrm>
+          <a:off x="0" y="0"/>
+          <a:ext cx="0" cy="0"/>
+          <a:chOff x="0" y="0"/>
+          <a:chExt cx="0" cy="0"/>
+        </a:xfrm>
+      </p:grpSpPr>
+      <p:pic>
+        <p:nvPicPr>
+          <p:cNvPr id="5122" name="Picture 2"/>
+          <p:cNvPicPr>
+            <a:picLocks noChangeAspect="1" noChangeArrowheads="1"/>
+          </p:cNvPicPr>
+          <p:nvPr/>
+        </p:nvPicPr>
+        <p:blipFill>
+          <a:blip r:embed="rId2">
+            <a:extLst>
+              <a:ext uri="{28A0092B-C50C-407E-A947-70E740481C1C}">
+                <a14:useLocalDpi xmlns:a14="http://schemas.microsoft.com/office/drawing/2010/main" val="0"/>
+              </a:ext>
+            </a:extLst>
+          </a:blip>
+          <a:srcRect/>
+          <a:stretch>
+            <a:fillRect/>
+          </a:stretch>
+        </p:blipFill>
+        <p:spPr bwMode="auto">
+          <a:xfrm>
+            <a:off x="1566863" y="1217613"/>
+            <a:ext cx="6010275" cy="4429125"/>
+          </a:xfrm>
+          <a:prstGeom prst="rect">
+            <a:avLst/>
+          </a:prstGeom>
+          <a:noFill/>
+          <a:ln>
+            <a:noFill/>
+          </a:ln>
+          <a:effectLst/>
+          <a:extLst>
+            <a:ext uri="{909E8E84-426E-40DD-AFC4-6F175D3DCCD1}">
+              <a14:hiddenFill xmlns:a14="http://schemas.microsoft.com/office/drawing/2010/main">
+                <a:solidFill>
+                  <a:schemeClr val="accent1"/>
+                </a:solidFill>
+              </a14:hiddenFill>
+            </a:ext>
+            <a:ext uri="{91240B29-F687-4F45-9708-019B960494DF}">
+              <a14:hiddenLine xmlns:a14="http://schemas.microsoft.com/office/drawing/2010/main" w="9525">
+                <a:solidFill>
+                  <a:schemeClr val="tx1"/>
+                </a:solidFill>
+                <a:miter lim="800000"/>
+                <a:headEnd/>
+                <a:tailEnd/>
+              </a14:hiddenLine>
+            </a:ext>
+            <a:ext uri="{AF507438-7753-43E0-B8FC-AC1667EBCBE1}">
+              <a14:hiddenEffects xmlns:a14="http://schemas.microsoft.com/office/drawing/2010/main">
+                <a:effectLst>
+                  <a:outerShdw dist="35921" dir="2700000" algn="ctr" rotWithShape="0">
+                    <a:schemeClr val="bg2"/>
+                  </a:outerShdw>
+                </a:effectLst>
+              </a14:hiddenEffects>
+            </a:ext>
+          </a:extLst>
+        </p:spPr>
+      </p:pic>
+      <p:sp>
+        <p:nvSpPr>
+          <p:cNvPr id="2" name="1 CuadroTexto"/>
+          <p:cNvSpPr txBox="1"/>
+          <p:nvPr/>
+        </p:nvSpPr>
+        <p:spPr>
+          <a:xfrm>
+            <a:off x="2483768" y="404664"/>
+            <a:ext cx="3672408" cy="369332"/>
+          </a:xfrm>
+          <a:prstGeom prst="rect">
+            <a:avLst/>
+          </a:prstGeom>
+          <a:noFill/>
+        </p:spPr>
+        <p:txBody>
+          <a:bodyPr wrap="square" rtlCol="0">
+            <a:spAutoFit/>
+          </a:bodyPr>
+          <a:lstStyle/>
+          <a:p>
+            <a:r>
+              <a:rPr lang="en-US" dirty="0" smtClean="0"/>
+              <a:t>Theta two, n=2</a:t>
+            </a:r>
+            <a:endParaRPr lang="en-US" dirty="0"/>
+          </a:p>
+        </p:txBody>
+      </p:sp>
+      <p:pic>
+        <p:nvPicPr>
+          <p:cNvPr id="5123" name="Picture 3"/>
+          <p:cNvPicPr>
+            <a:picLocks noChangeAspect="1" noChangeArrowheads="1"/>
+          </p:cNvPicPr>
+          <p:nvPr/>
+        </p:nvPicPr>
+        <p:blipFill>
+          <a:blip r:embed="rId3">
+            <a:extLst>
+              <a:ext uri="{28A0092B-C50C-407E-A947-70E740481C1C}">
+                <a14:useLocalDpi xmlns:a14="http://schemas.microsoft.com/office/drawing/2010/main" val="0"/>
+              </a:ext>
+            </a:extLst>
+          </a:blip>
+          <a:srcRect/>
+          <a:stretch>
+            <a:fillRect/>
+          </a:stretch>
+        </p:blipFill>
+        <p:spPr bwMode="auto">
+          <a:xfrm>
+            <a:off x="1719263" y="1366838"/>
+            <a:ext cx="6010275" cy="4429125"/>
+          </a:xfrm>
+          <a:prstGeom prst="rect">
+            <a:avLst/>
+          </a:prstGeom>
+          <a:noFill/>
+          <a:ln>
+            <a:noFill/>
+          </a:ln>
+          <a:extLst>
+            <a:ext uri="{909E8E84-426E-40DD-AFC4-6F175D3DCCD1}">
+              <a14:hiddenFill xmlns:a14="http://schemas.microsoft.com/office/drawing/2010/main">
+                <a:solidFill>
+                  <a:schemeClr val="accent1"/>
+                </a:solidFill>
+              </a14:hiddenFill>
+            </a:ext>
+            <a:ext uri="{91240B29-F687-4F45-9708-019B960494DF}">
+              <a14:hiddenLine xmlns:a14="http://schemas.microsoft.com/office/drawing/2010/main" w="9525">
+                <a:solidFill>
+                  <a:schemeClr val="tx1"/>
+                </a:solidFill>
+                <a:miter lim="800000"/>
+                <a:headEnd/>
+                <a:tailEnd/>
+              </a14:hiddenLine>
+            </a:ext>
+          </a:extLst>
+        </p:spPr>
+      </p:pic>
+    </p:spTree>
+    <p:extLst>
+      <p:ext uri="{BB962C8B-B14F-4D97-AF65-F5344CB8AC3E}">
+        <p14:creationId xmlns:p14="http://schemas.microsoft.com/office/powerpoint/2010/main" val="4277121361"/>
+      </p:ext>
+    </p:extLst>
+  </p:cSld>
+  <p:clrMapOvr>
+    <a:masterClrMapping/>
+  </p:clrMapOvr>
+  <p:timing>
+    <p:tnLst>
+      <p:par>
+        <p:cTn id="1" dur="indefinite" restart="never" nodeType="tmRoot"/>
+      </p:par>
+    </p:tnLst>
+  </p:timing>
+</p:sld>
+</file>
+
+<file path=ppt/slides/slide12.xml><?xml version="1.0" encoding="utf-8"?>
+<p:sld xmlns:a="http://schemas.openxmlformats.org/drawingml/2006/main" xmlns:r="http://schemas.openxmlformats.org/officeDocument/2006/relationships" xmlns:p="http://schemas.openxmlformats.org/presentationml/2006/main">
+  <p:cSld>
+    <p:spTree>
+      <p:nvGrpSpPr>
+        <p:cNvPr id="1" name=""/>
+        <p:cNvGrpSpPr/>
+        <p:nvPr/>
+      </p:nvGrpSpPr>
+      <p:grpSpPr>
+        <a:xfrm>
+          <a:off x="0" y="0"/>
+          <a:ext cx="0" cy="0"/>
+          <a:chOff x="0" y="0"/>
+          <a:chExt cx="0" cy="0"/>
+        </a:xfrm>
+      </p:grpSpPr>
+      <p:pic>
+        <p:nvPicPr>
           <p:cNvPr id="6146" name="Picture 2"/>
           <p:cNvPicPr>
             <a:picLocks noChangeAspect="1" noChangeArrowheads="1"/>
@@ -3293,7 +3571,7 @@
 </p:sld>
 </file>
 
-<file path=ppt/slides/slide11.xml><?xml version="1.0" encoding="utf-8"?>
+<file path=ppt/slides/slide13.xml><?xml version="1.0" encoding="utf-8"?>
 <p:sld xmlns:a="http://schemas.openxmlformats.org/drawingml/2006/main" xmlns:r="http://schemas.openxmlformats.org/officeDocument/2006/relationships" xmlns:p="http://schemas.openxmlformats.org/presentationml/2006/main">
   <p:cSld>
     <p:spTree>
@@ -3359,7 +3637,7 @@
 </p:sld>
 </file>
 
-<file path=ppt/slides/slide12.xml><?xml version="1.0" encoding="utf-8"?>
+<file path=ppt/slides/slide14.xml><?xml version="1.0" encoding="utf-8"?>
 <p:sld xmlns:a="http://schemas.openxmlformats.org/drawingml/2006/main" xmlns:r="http://schemas.openxmlformats.org/officeDocument/2006/relationships" xmlns:p="http://schemas.openxmlformats.org/presentationml/2006/main">
   <p:cSld>
     <p:spTree>
@@ -27927,6 +28205,258 @@
           <a:chExt cx="0" cy="0"/>
         </a:xfrm>
       </p:grpSpPr>
+      <p:pic>
+        <p:nvPicPr>
+          <p:cNvPr id="1027" name="Picture 3"/>
+          <p:cNvPicPr>
+            <a:picLocks noChangeAspect="1" noChangeArrowheads="1"/>
+          </p:cNvPicPr>
+          <p:nvPr/>
+        </p:nvPicPr>
+        <p:blipFill>
+          <a:blip r:embed="rId2">
+            <a:extLst>
+              <a:ext uri="{28A0092B-C50C-407E-A947-70E740481C1C}">
+                <a14:useLocalDpi xmlns:a14="http://schemas.microsoft.com/office/drawing/2010/main" val="0"/>
+              </a:ext>
+            </a:extLst>
+          </a:blip>
+          <a:srcRect/>
+          <a:stretch>
+            <a:fillRect/>
+          </a:stretch>
+        </p:blipFill>
+        <p:spPr bwMode="auto">
+          <a:xfrm>
+            <a:off x="1980778" y="1379538"/>
+            <a:ext cx="5543550" cy="4391025"/>
+          </a:xfrm>
+          <a:prstGeom prst="rect">
+            <a:avLst/>
+          </a:prstGeom>
+          <a:noFill/>
+          <a:ln>
+            <a:noFill/>
+          </a:ln>
+          <a:effectLst/>
+          <a:extLst>
+            <a:ext uri="{909E8E84-426E-40DD-AFC4-6F175D3DCCD1}">
+              <a14:hiddenFill xmlns:a14="http://schemas.microsoft.com/office/drawing/2010/main">
+                <a:solidFill>
+                  <a:schemeClr val="accent1"/>
+                </a:solidFill>
+              </a14:hiddenFill>
+            </a:ext>
+            <a:ext uri="{91240B29-F687-4F45-9708-019B960494DF}">
+              <a14:hiddenLine xmlns:a14="http://schemas.microsoft.com/office/drawing/2010/main" w="9525">
+                <a:solidFill>
+                  <a:schemeClr val="tx1"/>
+                </a:solidFill>
+                <a:miter lim="800000"/>
+                <a:headEnd/>
+                <a:tailEnd/>
+              </a14:hiddenLine>
+            </a:ext>
+            <a:ext uri="{AF507438-7753-43E0-B8FC-AC1667EBCBE1}">
+              <a14:hiddenEffects xmlns:a14="http://schemas.microsoft.com/office/drawing/2010/main">
+                <a:effectLst>
+                  <a:outerShdw dist="35921" dir="2700000" algn="ctr" rotWithShape="0">
+                    <a:schemeClr val="bg2"/>
+                  </a:outerShdw>
+                </a:effectLst>
+              </a14:hiddenEffects>
+            </a:ext>
+          </a:extLst>
+        </p:spPr>
+      </p:pic>
+      <p:sp>
+        <p:nvSpPr>
+          <p:cNvPr id="2" name="1 CuadroTexto"/>
+          <p:cNvSpPr txBox="1"/>
+          <p:nvPr/>
+        </p:nvSpPr>
+        <p:spPr>
+          <a:xfrm>
+            <a:off x="3443940" y="827420"/>
+            <a:ext cx="2218813" cy="461665"/>
+          </a:xfrm>
+          <a:prstGeom prst="rect">
+            <a:avLst/>
+          </a:prstGeom>
+          <a:noFill/>
+        </p:spPr>
+        <p:txBody>
+          <a:bodyPr wrap="none" rtlCol="0">
+            <a:spAutoFit/>
+          </a:bodyPr>
+          <a:lstStyle/>
+          <a:p>
+            <a:r>
+              <a:rPr lang="en-US" sz="2400" dirty="0" smtClean="0"/>
+              <a:t>Gamma method</a:t>
+            </a:r>
+            <a:endParaRPr lang="en-US" sz="2400" dirty="0"/>
+          </a:p>
+        </p:txBody>
+      </p:sp>
+    </p:spTree>
+    <p:extLst>
+      <p:ext uri="{BB962C8B-B14F-4D97-AF65-F5344CB8AC3E}">
+        <p14:creationId xmlns:p14="http://schemas.microsoft.com/office/powerpoint/2010/main" val="773961054"/>
+      </p:ext>
+    </p:extLst>
+  </p:cSld>
+  <p:clrMapOvr>
+    <a:masterClrMapping/>
+  </p:clrMapOvr>
+</p:sld>
+</file>
+
+<file path=ppt/slides/slide3.xml><?xml version="1.0" encoding="utf-8"?>
+<p:sld xmlns:a="http://schemas.openxmlformats.org/drawingml/2006/main" xmlns:r="http://schemas.openxmlformats.org/officeDocument/2006/relationships" xmlns:p="http://schemas.openxmlformats.org/presentationml/2006/main">
+  <p:cSld>
+    <p:spTree>
+      <p:nvGrpSpPr>
+        <p:cNvPr id="1" name=""/>
+        <p:cNvGrpSpPr/>
+        <p:nvPr/>
+      </p:nvGrpSpPr>
+      <p:grpSpPr>
+        <a:xfrm>
+          <a:off x="0" y="0"/>
+          <a:ext cx="0" cy="0"/>
+          <a:chOff x="0" y="0"/>
+          <a:chExt cx="0" cy="0"/>
+        </a:xfrm>
+      </p:grpSpPr>
+      <p:pic>
+        <p:nvPicPr>
+          <p:cNvPr id="2050" name="Picture 2"/>
+          <p:cNvPicPr>
+            <a:picLocks noChangeAspect="1" noChangeArrowheads="1"/>
+          </p:cNvPicPr>
+          <p:nvPr/>
+        </p:nvPicPr>
+        <p:blipFill>
+          <a:blip r:embed="rId2">
+            <a:extLst>
+              <a:ext uri="{28A0092B-C50C-407E-A947-70E740481C1C}">
+                <a14:useLocalDpi xmlns:a14="http://schemas.microsoft.com/office/drawing/2010/main" val="0"/>
+              </a:ext>
+            </a:extLst>
+          </a:blip>
+          <a:srcRect/>
+          <a:stretch>
+            <a:fillRect/>
+          </a:stretch>
+        </p:blipFill>
+        <p:spPr bwMode="auto">
+          <a:xfrm>
+            <a:off x="1800225" y="941784"/>
+            <a:ext cx="5543550" cy="5943600"/>
+          </a:xfrm>
+          <a:prstGeom prst="rect">
+            <a:avLst/>
+          </a:prstGeom>
+          <a:noFill/>
+          <a:ln>
+            <a:noFill/>
+          </a:ln>
+          <a:effectLst/>
+          <a:extLst>
+            <a:ext uri="{909E8E84-426E-40DD-AFC4-6F175D3DCCD1}">
+              <a14:hiddenFill xmlns:a14="http://schemas.microsoft.com/office/drawing/2010/main">
+                <a:solidFill>
+                  <a:schemeClr val="accent1"/>
+                </a:solidFill>
+              </a14:hiddenFill>
+            </a:ext>
+            <a:ext uri="{91240B29-F687-4F45-9708-019B960494DF}">
+              <a14:hiddenLine xmlns:a14="http://schemas.microsoft.com/office/drawing/2010/main" w="9525">
+                <a:solidFill>
+                  <a:schemeClr val="tx1"/>
+                </a:solidFill>
+                <a:miter lim="800000"/>
+                <a:headEnd/>
+                <a:tailEnd/>
+              </a14:hiddenLine>
+            </a:ext>
+            <a:ext uri="{AF507438-7753-43E0-B8FC-AC1667EBCBE1}">
+              <a14:hiddenEffects xmlns:a14="http://schemas.microsoft.com/office/drawing/2010/main">
+                <a:effectLst>
+                  <a:outerShdw dist="35921" dir="2700000" algn="ctr" rotWithShape="0">
+                    <a:schemeClr val="bg2"/>
+                  </a:outerShdw>
+                </a:effectLst>
+              </a14:hiddenEffects>
+            </a:ext>
+          </a:extLst>
+        </p:spPr>
+      </p:pic>
+      <p:sp>
+        <p:nvSpPr>
+          <p:cNvPr id="3" name="2 CuadroTexto"/>
+          <p:cNvSpPr txBox="1"/>
+          <p:nvPr/>
+        </p:nvSpPr>
+        <p:spPr>
+          <a:xfrm>
+            <a:off x="3542622" y="404664"/>
+            <a:ext cx="2037866" cy="461665"/>
+          </a:xfrm>
+          <a:prstGeom prst="rect">
+            <a:avLst/>
+          </a:prstGeom>
+          <a:noFill/>
+        </p:spPr>
+        <p:txBody>
+          <a:bodyPr wrap="none" rtlCol="0">
+            <a:spAutoFit/>
+          </a:bodyPr>
+          <a:lstStyle/>
+          <a:p>
+            <a:r>
+              <a:rPr lang="en-US" sz="2400" dirty="0" err="1" smtClean="0"/>
+              <a:t>Ewens</a:t>
+            </a:r>
+            <a:r>
+              <a:rPr lang="en-US" sz="2400" dirty="0" smtClean="0"/>
+              <a:t> method</a:t>
+            </a:r>
+            <a:endParaRPr lang="en-US" sz="2400" dirty="0"/>
+          </a:p>
+        </p:txBody>
+      </p:sp>
+    </p:spTree>
+    <p:extLst>
+      <p:ext uri="{BB962C8B-B14F-4D97-AF65-F5344CB8AC3E}">
+        <p14:creationId xmlns:p14="http://schemas.microsoft.com/office/powerpoint/2010/main" val="3716040133"/>
+      </p:ext>
+    </p:extLst>
+  </p:cSld>
+  <p:clrMapOvr>
+    <a:masterClrMapping/>
+  </p:clrMapOvr>
+</p:sld>
+</file>
+
+<file path=ppt/slides/slide4.xml><?xml version="1.0" encoding="utf-8"?>
+<p:sld xmlns:a="http://schemas.openxmlformats.org/drawingml/2006/main" xmlns:r="http://schemas.openxmlformats.org/officeDocument/2006/relationships" xmlns:p="http://schemas.openxmlformats.org/presentationml/2006/main">
+  <p:cSld>
+    <p:spTree>
+      <p:nvGrpSpPr>
+        <p:cNvPr id="1" name=""/>
+        <p:cNvGrpSpPr/>
+        <p:nvPr/>
+      </p:nvGrpSpPr>
+      <p:grpSpPr>
+        <a:xfrm>
+          <a:off x="0" y="0"/>
+          <a:ext cx="0" cy="0"/>
+          <a:chOff x="0" y="0"/>
+          <a:chExt cx="0" cy="0"/>
+        </a:xfrm>
+      </p:grpSpPr>
       <p:sp>
         <p:nvSpPr>
           <p:cNvPr id="2" name="1 Título"/>
@@ -27944,11 +28474,7 @@
           <a:p>
             <a:r>
               <a:rPr lang="en-US" dirty="0" smtClean="0"/>
-              <a:t>Figure </a:t>
-            </a:r>
-            <a:r>
-              <a:rPr lang="en-US" dirty="0" smtClean="0"/>
-              <a:t>3a</a:t>
+              <a:t>Figure 3a</a:t>
             </a:r>
             <a:endParaRPr lang="en-US" dirty="0"/>
           </a:p>
@@ -28028,7 +28554,7 @@
 </p:sld>
 </file>
 
-<file path=ppt/slides/slide3.xml><?xml version="1.0" encoding="utf-8"?>
+<file path=ppt/slides/slide5.xml><?xml version="1.0" encoding="utf-8"?>
 <p:sld xmlns:a="http://schemas.openxmlformats.org/drawingml/2006/main" xmlns:r="http://schemas.openxmlformats.org/officeDocument/2006/relationships" xmlns:p="http://schemas.openxmlformats.org/presentationml/2006/main">
   <p:cSld>
     <p:spTree>
@@ -28152,7 +28678,7 @@
 </p:sld>
 </file>
 
-<file path=ppt/slides/slide4.xml><?xml version="1.0" encoding="utf-8"?>
+<file path=ppt/slides/slide6.xml><?xml version="1.0" encoding="utf-8"?>
 <p:sld xmlns:a="http://schemas.openxmlformats.org/drawingml/2006/main" xmlns:r="http://schemas.openxmlformats.org/officeDocument/2006/relationships" xmlns:p="http://schemas.openxmlformats.org/presentationml/2006/main">
   <p:cSld>
     <p:spTree>
@@ -28291,7 +28817,7 @@
 </p:sld>
 </file>
 
-<file path=ppt/slides/slide5.xml><?xml version="1.0" encoding="utf-8"?>
+<file path=ppt/slides/slide7.xml><?xml version="1.0" encoding="utf-8"?>
 <p:sld xmlns:a="http://schemas.openxmlformats.org/drawingml/2006/main" xmlns:r="http://schemas.openxmlformats.org/officeDocument/2006/relationships" xmlns:p="http://schemas.openxmlformats.org/presentationml/2006/main">
   <p:cSld>
     <p:spTree>
@@ -28641,7 +29167,7 @@
 </p:sld>
 </file>
 
-<file path=ppt/slides/slide6.xml><?xml version="1.0" encoding="utf-8"?>
+<file path=ppt/slides/slide8.xml><?xml version="1.0" encoding="utf-8"?>
 <p:sld xmlns:a="http://schemas.openxmlformats.org/drawingml/2006/main" xmlns:r="http://schemas.openxmlformats.org/officeDocument/2006/relationships" xmlns:p="http://schemas.openxmlformats.org/presentationml/2006/main">
   <p:cSld>
     <p:spTree>
@@ -28991,7 +29517,7 @@
 </p:sld>
 </file>
 
-<file path=ppt/slides/slide7.xml><?xml version="1.0" encoding="utf-8"?>
+<file path=ppt/slides/slide9.xml><?xml version="1.0" encoding="utf-8"?>
 <p:sld xmlns:a="http://schemas.openxmlformats.org/drawingml/2006/main" xmlns:r="http://schemas.openxmlformats.org/officeDocument/2006/relationships" xmlns:p="http://schemas.openxmlformats.org/presentationml/2006/main">
   <p:cSld>
     <p:spTree>
@@ -29106,282 +29632,6 @@
     <p:extLst>
       <p:ext uri="{BB962C8B-B14F-4D97-AF65-F5344CB8AC3E}">
         <p14:creationId xmlns:p14="http://schemas.microsoft.com/office/powerpoint/2010/main" val="536557031"/>
-      </p:ext>
-    </p:extLst>
-  </p:cSld>
-  <p:clrMapOvr>
-    <a:masterClrMapping/>
-  </p:clrMapOvr>
-  <p:timing>
-    <p:tnLst>
-      <p:par>
-        <p:cTn id="1" dur="indefinite" restart="never" nodeType="tmRoot"/>
-      </p:par>
-    </p:tnLst>
-  </p:timing>
-</p:sld>
-</file>
-
-<file path=ppt/slides/slide8.xml><?xml version="1.0" encoding="utf-8"?>
-<p:sld xmlns:a="http://schemas.openxmlformats.org/drawingml/2006/main" xmlns:r="http://schemas.openxmlformats.org/officeDocument/2006/relationships" xmlns:p="http://schemas.openxmlformats.org/presentationml/2006/main">
-  <p:cSld>
-    <p:spTree>
-      <p:nvGrpSpPr>
-        <p:cNvPr id="1" name=""/>
-        <p:cNvGrpSpPr/>
-        <p:nvPr/>
-      </p:nvGrpSpPr>
-      <p:grpSpPr>
-        <a:xfrm>
-          <a:off x="0" y="0"/>
-          <a:ext cx="0" cy="0"/>
-          <a:chOff x="0" y="0"/>
-          <a:chExt cx="0" cy="0"/>
-        </a:xfrm>
-      </p:grpSpPr>
-      <p:pic>
-        <p:nvPicPr>
-          <p:cNvPr id="3074" name="Picture 2"/>
-          <p:cNvPicPr>
-            <a:picLocks noChangeAspect="1" noChangeArrowheads="1"/>
-          </p:cNvPicPr>
-          <p:nvPr/>
-        </p:nvPicPr>
-        <p:blipFill>
-          <a:blip r:embed="rId2">
-            <a:extLst>
-              <a:ext uri="{28A0092B-C50C-407E-A947-70E740481C1C}">
-                <a14:useLocalDpi xmlns:a14="http://schemas.microsoft.com/office/drawing/2010/main" val="0"/>
-              </a:ext>
-            </a:extLst>
-          </a:blip>
-          <a:srcRect/>
-          <a:stretch>
-            <a:fillRect/>
-          </a:stretch>
-        </p:blipFill>
-        <p:spPr bwMode="auto">
-          <a:xfrm>
-            <a:off x="1676400" y="2328863"/>
-            <a:ext cx="5791200" cy="2200275"/>
-          </a:xfrm>
-          <a:prstGeom prst="rect">
-            <a:avLst/>
-          </a:prstGeom>
-          <a:noFill/>
-          <a:ln>
-            <a:noFill/>
-          </a:ln>
-          <a:extLst>
-            <a:ext uri="{909E8E84-426E-40DD-AFC4-6F175D3DCCD1}">
-              <a14:hiddenFill xmlns:a14="http://schemas.microsoft.com/office/drawing/2010/main">
-                <a:solidFill>
-                  <a:schemeClr val="accent1"/>
-                </a:solidFill>
-              </a14:hiddenFill>
-            </a:ext>
-            <a:ext uri="{91240B29-F687-4F45-9708-019B960494DF}">
-              <a14:hiddenLine xmlns:a14="http://schemas.microsoft.com/office/drawing/2010/main" w="9525">
-                <a:solidFill>
-                  <a:schemeClr val="tx1"/>
-                </a:solidFill>
-                <a:miter lim="800000"/>
-                <a:headEnd/>
-                <a:tailEnd/>
-              </a14:hiddenLine>
-            </a:ext>
-          </a:extLst>
-        </p:spPr>
-      </p:pic>
-    </p:spTree>
-    <p:extLst>
-      <p:ext uri="{BB962C8B-B14F-4D97-AF65-F5344CB8AC3E}">
-        <p14:creationId xmlns:p14="http://schemas.microsoft.com/office/powerpoint/2010/main" val="1767875964"/>
-      </p:ext>
-    </p:extLst>
-  </p:cSld>
-  <p:clrMapOvr>
-    <a:masterClrMapping/>
-  </p:clrMapOvr>
-  <p:timing>
-    <p:tnLst>
-      <p:par>
-        <p:cTn id="1" dur="indefinite" restart="never" nodeType="tmRoot"/>
-      </p:par>
-    </p:tnLst>
-  </p:timing>
-</p:sld>
-</file>
-
-<file path=ppt/slides/slide9.xml><?xml version="1.0" encoding="utf-8"?>
-<p:sld xmlns:a="http://schemas.openxmlformats.org/drawingml/2006/main" xmlns:r="http://schemas.openxmlformats.org/officeDocument/2006/relationships" xmlns:p="http://schemas.openxmlformats.org/presentationml/2006/main">
-  <p:cSld>
-    <p:spTree>
-      <p:nvGrpSpPr>
-        <p:cNvPr id="1" name=""/>
-        <p:cNvGrpSpPr/>
-        <p:nvPr/>
-      </p:nvGrpSpPr>
-      <p:grpSpPr>
-        <a:xfrm>
-          <a:off x="0" y="0"/>
-          <a:ext cx="0" cy="0"/>
-          <a:chOff x="0" y="0"/>
-          <a:chExt cx="0" cy="0"/>
-        </a:xfrm>
-      </p:grpSpPr>
-      <p:pic>
-        <p:nvPicPr>
-          <p:cNvPr id="5122" name="Picture 2"/>
-          <p:cNvPicPr>
-            <a:picLocks noChangeAspect="1" noChangeArrowheads="1"/>
-          </p:cNvPicPr>
-          <p:nvPr/>
-        </p:nvPicPr>
-        <p:blipFill>
-          <a:blip r:embed="rId2">
-            <a:extLst>
-              <a:ext uri="{28A0092B-C50C-407E-A947-70E740481C1C}">
-                <a14:useLocalDpi xmlns:a14="http://schemas.microsoft.com/office/drawing/2010/main" val="0"/>
-              </a:ext>
-            </a:extLst>
-          </a:blip>
-          <a:srcRect/>
-          <a:stretch>
-            <a:fillRect/>
-          </a:stretch>
-        </p:blipFill>
-        <p:spPr bwMode="auto">
-          <a:xfrm>
-            <a:off x="1566863" y="1217613"/>
-            <a:ext cx="6010275" cy="4429125"/>
-          </a:xfrm>
-          <a:prstGeom prst="rect">
-            <a:avLst/>
-          </a:prstGeom>
-          <a:noFill/>
-          <a:ln>
-            <a:noFill/>
-          </a:ln>
-          <a:effectLst/>
-          <a:extLst>
-            <a:ext uri="{909E8E84-426E-40DD-AFC4-6F175D3DCCD1}">
-              <a14:hiddenFill xmlns:a14="http://schemas.microsoft.com/office/drawing/2010/main">
-                <a:solidFill>
-                  <a:schemeClr val="accent1"/>
-                </a:solidFill>
-              </a14:hiddenFill>
-            </a:ext>
-            <a:ext uri="{91240B29-F687-4F45-9708-019B960494DF}">
-              <a14:hiddenLine xmlns:a14="http://schemas.microsoft.com/office/drawing/2010/main" w="9525">
-                <a:solidFill>
-                  <a:schemeClr val="tx1"/>
-                </a:solidFill>
-                <a:miter lim="800000"/>
-                <a:headEnd/>
-                <a:tailEnd/>
-              </a14:hiddenLine>
-            </a:ext>
-            <a:ext uri="{AF507438-7753-43E0-B8FC-AC1667EBCBE1}">
-              <a14:hiddenEffects xmlns:a14="http://schemas.microsoft.com/office/drawing/2010/main">
-                <a:effectLst>
-                  <a:outerShdw dist="35921" dir="2700000" algn="ctr" rotWithShape="0">
-                    <a:schemeClr val="bg2"/>
-                  </a:outerShdw>
-                </a:effectLst>
-              </a14:hiddenEffects>
-            </a:ext>
-          </a:extLst>
-        </p:spPr>
-      </p:pic>
-      <p:sp>
-        <p:nvSpPr>
-          <p:cNvPr id="2" name="1 CuadroTexto"/>
-          <p:cNvSpPr txBox="1"/>
-          <p:nvPr/>
-        </p:nvSpPr>
-        <p:spPr>
-          <a:xfrm>
-            <a:off x="2483768" y="404664"/>
-            <a:ext cx="3672408" cy="369332"/>
-          </a:xfrm>
-          <a:prstGeom prst="rect">
-            <a:avLst/>
-          </a:prstGeom>
-          <a:noFill/>
-        </p:spPr>
-        <p:txBody>
-          <a:bodyPr wrap="square" rtlCol="0">
-            <a:spAutoFit/>
-          </a:bodyPr>
-          <a:lstStyle/>
-          <a:p>
-            <a:r>
-              <a:rPr lang="en-US" dirty="0" smtClean="0"/>
-              <a:t>Theta two, n=2</a:t>
-            </a:r>
-            <a:endParaRPr lang="en-US" dirty="0"/>
-          </a:p>
-        </p:txBody>
-      </p:sp>
-      <p:pic>
-        <p:nvPicPr>
-          <p:cNvPr id="5123" name="Picture 3"/>
-          <p:cNvPicPr>
-            <a:picLocks noChangeAspect="1" noChangeArrowheads="1"/>
-          </p:cNvPicPr>
-          <p:nvPr/>
-        </p:nvPicPr>
-        <p:blipFill>
-          <a:blip r:embed="rId3">
-            <a:extLst>
-              <a:ext uri="{28A0092B-C50C-407E-A947-70E740481C1C}">
-                <a14:useLocalDpi xmlns:a14="http://schemas.microsoft.com/office/drawing/2010/main" val="0"/>
-              </a:ext>
-            </a:extLst>
-          </a:blip>
-          <a:srcRect/>
-          <a:stretch>
-            <a:fillRect/>
-          </a:stretch>
-        </p:blipFill>
-        <p:spPr bwMode="auto">
-          <a:xfrm>
-            <a:off x="1719263" y="1366838"/>
-            <a:ext cx="6010275" cy="4429125"/>
-          </a:xfrm>
-          <a:prstGeom prst="rect">
-            <a:avLst/>
-          </a:prstGeom>
-          <a:noFill/>
-          <a:ln>
-            <a:noFill/>
-          </a:ln>
-          <a:extLst>
-            <a:ext uri="{909E8E84-426E-40DD-AFC4-6F175D3DCCD1}">
-              <a14:hiddenFill xmlns:a14="http://schemas.microsoft.com/office/drawing/2010/main">
-                <a:solidFill>
-                  <a:schemeClr val="accent1"/>
-                </a:solidFill>
-              </a14:hiddenFill>
-            </a:ext>
-            <a:ext uri="{91240B29-F687-4F45-9708-019B960494DF}">
-              <a14:hiddenLine xmlns:a14="http://schemas.microsoft.com/office/drawing/2010/main" w="9525">
-                <a:solidFill>
-                  <a:schemeClr val="tx1"/>
-                </a:solidFill>
-                <a:miter lim="800000"/>
-                <a:headEnd/>
-                <a:tailEnd/>
-              </a14:hiddenLine>
-            </a:ext>
-          </a:extLst>
-        </p:spPr>
-      </p:pic>
-    </p:spTree>
-    <p:extLst>
-      <p:ext uri="{BB962C8B-B14F-4D97-AF65-F5344CB8AC3E}">
-        <p14:creationId xmlns:p14="http://schemas.microsoft.com/office/powerpoint/2010/main" val="4277121361"/>
       </p:ext>
     </p:extLst>
   </p:cSld>

</xml_diff>